<commit_message>
slides, readmes, you name it
</commit_message>
<xml_diff>
--- a/slides/1 - TypeScript.pptx
+++ b/slides/1 - TypeScript.pptx
@@ -4,10 +4,28 @@
   <p:sldMasterIdLst>
     <p:sldMasterId id="2147483648" r:id="rId1"/>
   </p:sldMasterIdLst>
+  <p:notesMasterIdLst>
+    <p:notesMasterId r:id="rId20"/>
+  </p:notesMasterIdLst>
   <p:sldIdLst>
     <p:sldId id="256" r:id="rId2"/>
     <p:sldId id="257" r:id="rId3"/>
-    <p:sldId id="258" r:id="rId4"/>
+    <p:sldId id="269" r:id="rId4"/>
+    <p:sldId id="270" r:id="rId5"/>
+    <p:sldId id="271" r:id="rId6"/>
+    <p:sldId id="258" r:id="rId7"/>
+    <p:sldId id="259" r:id="rId8"/>
+    <p:sldId id="262" r:id="rId9"/>
+    <p:sldId id="263" r:id="rId10"/>
+    <p:sldId id="264" r:id="rId11"/>
+    <p:sldId id="260" r:id="rId12"/>
+    <p:sldId id="261" r:id="rId13"/>
+    <p:sldId id="265" r:id="rId14"/>
+    <p:sldId id="266" r:id="rId15"/>
+    <p:sldId id="272" r:id="rId16"/>
+    <p:sldId id="267" r:id="rId17"/>
+    <p:sldId id="268" r:id="rId18"/>
+    <p:sldId id="273" r:id="rId19"/>
   </p:sldIdLst>
   <p:sldSz cx="12192000" cy="6858000"/>
   <p:notesSz cx="6858000" cy="9144000"/>
@@ -106,7 +124,662 @@
       </a:defRPr>
     </a:lvl9pPr>
   </p:defaultTextStyle>
+  <p:extLst>
+    <p:ext uri="{EFAFB233-063F-42B5-8137-9DF3F51BA10A}">
+      <p15:sldGuideLst xmlns:p15="http://schemas.microsoft.com/office/powerpoint/2012/main"/>
+    </p:ext>
+  </p:extLst>
 </p:presentation>
+</file>
+
+<file path=ppt/notesMasters/notesMaster1.xml><?xml version="1.0" encoding="utf-8"?>
+<p:notesMaster xmlns:a="http://schemas.openxmlformats.org/drawingml/2006/main" xmlns:r="http://schemas.openxmlformats.org/officeDocument/2006/relationships" xmlns:p="http://schemas.openxmlformats.org/presentationml/2006/main">
+  <p:cSld>
+    <p:bg>
+      <p:bgRef idx="1001">
+        <a:schemeClr val="bg1"/>
+      </p:bgRef>
+    </p:bg>
+    <p:spTree>
+      <p:nvGrpSpPr>
+        <p:cNvPr id="1" name=""/>
+        <p:cNvGrpSpPr/>
+        <p:nvPr/>
+      </p:nvGrpSpPr>
+      <p:grpSpPr>
+        <a:xfrm>
+          <a:off x="0" y="0"/>
+          <a:ext cx="0" cy="0"/>
+          <a:chOff x="0" y="0"/>
+          <a:chExt cx="0" cy="0"/>
+        </a:xfrm>
+      </p:grpSpPr>
+      <p:sp>
+        <p:nvSpPr>
+          <p:cNvPr id="2" name="Header Placeholder 1"/>
+          <p:cNvSpPr>
+            <a:spLocks noGrp="1"/>
+          </p:cNvSpPr>
+          <p:nvPr>
+            <p:ph type="hdr" sz="quarter"/>
+          </p:nvPr>
+        </p:nvSpPr>
+        <p:spPr>
+          <a:xfrm>
+            <a:off x="0" y="0"/>
+            <a:ext cx="2971800" cy="458788"/>
+          </a:xfrm>
+          <a:prstGeom prst="rect">
+            <a:avLst/>
+          </a:prstGeom>
+        </p:spPr>
+        <p:txBody>
+          <a:bodyPr vert="horz" lIns="91440" tIns="45720" rIns="91440" bIns="45720" rtlCol="0"/>
+          <a:lstStyle>
+            <a:lvl1pPr algn="l">
+              <a:defRPr sz="1200"/>
+            </a:lvl1pPr>
+          </a:lstStyle>
+          <a:p>
+            <a:endParaRPr lang="en-US"/>
+          </a:p>
+        </p:txBody>
+      </p:sp>
+      <p:sp>
+        <p:nvSpPr>
+          <p:cNvPr id="3" name="Date Placeholder 2"/>
+          <p:cNvSpPr>
+            <a:spLocks noGrp="1"/>
+          </p:cNvSpPr>
+          <p:nvPr>
+            <p:ph type="dt" idx="1"/>
+          </p:nvPr>
+        </p:nvSpPr>
+        <p:spPr>
+          <a:xfrm>
+            <a:off x="3884613" y="0"/>
+            <a:ext cx="2971800" cy="458788"/>
+          </a:xfrm>
+          <a:prstGeom prst="rect">
+            <a:avLst/>
+          </a:prstGeom>
+        </p:spPr>
+        <p:txBody>
+          <a:bodyPr vert="horz" lIns="91440" tIns="45720" rIns="91440" bIns="45720" rtlCol="0"/>
+          <a:lstStyle>
+            <a:lvl1pPr algn="r">
+              <a:defRPr sz="1200"/>
+            </a:lvl1pPr>
+          </a:lstStyle>
+          <a:p>
+            <a:fld id="{6C13164A-2D85-4B92-A6B1-4BF3B5EF6CDA}" type="datetimeFigureOut">
+              <a:rPr lang="en-US" smtClean="0"/>
+              <a:t>5/15/2016</a:t>
+            </a:fld>
+            <a:endParaRPr lang="en-US"/>
+          </a:p>
+        </p:txBody>
+      </p:sp>
+      <p:sp>
+        <p:nvSpPr>
+          <p:cNvPr id="4" name="Slide Image Placeholder 3"/>
+          <p:cNvSpPr>
+            <a:spLocks noGrp="1" noRot="1" noChangeAspect="1"/>
+          </p:cNvSpPr>
+          <p:nvPr>
+            <p:ph type="sldImg" idx="2"/>
+          </p:nvPr>
+        </p:nvSpPr>
+        <p:spPr>
+          <a:xfrm>
+            <a:off x="685800" y="1143000"/>
+            <a:ext cx="5486400" cy="3086100"/>
+          </a:xfrm>
+          <a:prstGeom prst="rect">
+            <a:avLst/>
+          </a:prstGeom>
+          <a:noFill/>
+          <a:ln w="12700">
+            <a:solidFill>
+              <a:prstClr val="black"/>
+            </a:solidFill>
+          </a:ln>
+        </p:spPr>
+        <p:txBody>
+          <a:bodyPr vert="horz" lIns="91440" tIns="45720" rIns="91440" bIns="45720" rtlCol="0" anchor="ctr"/>
+          <a:lstStyle/>
+          <a:p>
+            <a:endParaRPr lang="en-US"/>
+          </a:p>
+        </p:txBody>
+      </p:sp>
+      <p:sp>
+        <p:nvSpPr>
+          <p:cNvPr id="5" name="Notes Placeholder 4"/>
+          <p:cNvSpPr>
+            <a:spLocks noGrp="1"/>
+          </p:cNvSpPr>
+          <p:nvPr>
+            <p:ph type="body" sz="quarter" idx="3"/>
+          </p:nvPr>
+        </p:nvSpPr>
+        <p:spPr>
+          <a:xfrm>
+            <a:off x="685800" y="4400550"/>
+            <a:ext cx="5486400" cy="3600450"/>
+          </a:xfrm>
+          <a:prstGeom prst="rect">
+            <a:avLst/>
+          </a:prstGeom>
+        </p:spPr>
+        <p:txBody>
+          <a:bodyPr vert="horz" lIns="91440" tIns="45720" rIns="91440" bIns="45720" rtlCol="0"/>
+          <a:lstStyle/>
+          <a:p>
+            <a:pPr lvl="0"/>
+            <a:r>
+              <a:rPr lang="en-US"/>
+              <a:t>Edit Master text styles</a:t>
+            </a:r>
+          </a:p>
+          <a:p>
+            <a:pPr lvl="1"/>
+            <a:r>
+              <a:rPr lang="en-US"/>
+              <a:t>Second level</a:t>
+            </a:r>
+          </a:p>
+          <a:p>
+            <a:pPr lvl="2"/>
+            <a:r>
+              <a:rPr lang="en-US"/>
+              <a:t>Third level</a:t>
+            </a:r>
+          </a:p>
+          <a:p>
+            <a:pPr lvl="3"/>
+            <a:r>
+              <a:rPr lang="en-US"/>
+              <a:t>Fourth level</a:t>
+            </a:r>
+          </a:p>
+          <a:p>
+            <a:pPr lvl="4"/>
+            <a:r>
+              <a:rPr lang="en-US"/>
+              <a:t>Fifth level</a:t>
+            </a:r>
+          </a:p>
+        </p:txBody>
+      </p:sp>
+      <p:sp>
+        <p:nvSpPr>
+          <p:cNvPr id="6" name="Footer Placeholder 5"/>
+          <p:cNvSpPr>
+            <a:spLocks noGrp="1"/>
+          </p:cNvSpPr>
+          <p:nvPr>
+            <p:ph type="ftr" sz="quarter" idx="4"/>
+          </p:nvPr>
+        </p:nvSpPr>
+        <p:spPr>
+          <a:xfrm>
+            <a:off x="0" y="8685213"/>
+            <a:ext cx="2971800" cy="458787"/>
+          </a:xfrm>
+          <a:prstGeom prst="rect">
+            <a:avLst/>
+          </a:prstGeom>
+        </p:spPr>
+        <p:txBody>
+          <a:bodyPr vert="horz" lIns="91440" tIns="45720" rIns="91440" bIns="45720" rtlCol="0" anchor="b"/>
+          <a:lstStyle>
+            <a:lvl1pPr algn="l">
+              <a:defRPr sz="1200"/>
+            </a:lvl1pPr>
+          </a:lstStyle>
+          <a:p>
+            <a:endParaRPr lang="en-US"/>
+          </a:p>
+        </p:txBody>
+      </p:sp>
+      <p:sp>
+        <p:nvSpPr>
+          <p:cNvPr id="7" name="Slide Number Placeholder 6"/>
+          <p:cNvSpPr>
+            <a:spLocks noGrp="1"/>
+          </p:cNvSpPr>
+          <p:nvPr>
+            <p:ph type="sldNum" sz="quarter" idx="5"/>
+          </p:nvPr>
+        </p:nvSpPr>
+        <p:spPr>
+          <a:xfrm>
+            <a:off x="3884613" y="8685213"/>
+            <a:ext cx="2971800" cy="458787"/>
+          </a:xfrm>
+          <a:prstGeom prst="rect">
+            <a:avLst/>
+          </a:prstGeom>
+        </p:spPr>
+        <p:txBody>
+          <a:bodyPr vert="horz" lIns="91440" tIns="45720" rIns="91440" bIns="45720" rtlCol="0" anchor="b"/>
+          <a:lstStyle>
+            <a:lvl1pPr algn="r">
+              <a:defRPr sz="1200"/>
+            </a:lvl1pPr>
+          </a:lstStyle>
+          <a:p>
+            <a:fld id="{CBBECB81-0CD9-4382-87B9-38A0B5BD9646}" type="slidenum">
+              <a:rPr lang="en-US" smtClean="0"/>
+              <a:t>‹#›</a:t>
+            </a:fld>
+            <a:endParaRPr lang="en-US"/>
+          </a:p>
+        </p:txBody>
+      </p:sp>
+    </p:spTree>
+    <p:extLst>
+      <p:ext uri="{BB962C8B-B14F-4D97-AF65-F5344CB8AC3E}">
+        <p14:creationId xmlns:p14="http://schemas.microsoft.com/office/powerpoint/2010/main" val="1226350737"/>
+      </p:ext>
+    </p:extLst>
+  </p:cSld>
+  <p:clrMap bg1="lt1" tx1="dk1" bg2="lt2" tx2="dk2" accent1="accent1" accent2="accent2" accent3="accent3" accent4="accent4" accent5="accent5" accent6="accent6" hlink="hlink" folHlink="folHlink"/>
+  <p:notesStyle>
+    <a:lvl1pPr marL="0" algn="l" defTabSz="914400" rtl="0" eaLnBrk="1" latinLnBrk="0" hangingPunct="1">
+      <a:defRPr sz="1200" kern="1200">
+        <a:solidFill>
+          <a:schemeClr val="tx1"/>
+        </a:solidFill>
+        <a:latin typeface="+mn-lt"/>
+        <a:ea typeface="+mn-ea"/>
+        <a:cs typeface="+mn-cs"/>
+      </a:defRPr>
+    </a:lvl1pPr>
+    <a:lvl2pPr marL="457200" algn="l" defTabSz="914400" rtl="0" eaLnBrk="1" latinLnBrk="0" hangingPunct="1">
+      <a:defRPr sz="1200" kern="1200">
+        <a:solidFill>
+          <a:schemeClr val="tx1"/>
+        </a:solidFill>
+        <a:latin typeface="+mn-lt"/>
+        <a:ea typeface="+mn-ea"/>
+        <a:cs typeface="+mn-cs"/>
+      </a:defRPr>
+    </a:lvl2pPr>
+    <a:lvl3pPr marL="914400" algn="l" defTabSz="914400" rtl="0" eaLnBrk="1" latinLnBrk="0" hangingPunct="1">
+      <a:defRPr sz="1200" kern="1200">
+        <a:solidFill>
+          <a:schemeClr val="tx1"/>
+        </a:solidFill>
+        <a:latin typeface="+mn-lt"/>
+        <a:ea typeface="+mn-ea"/>
+        <a:cs typeface="+mn-cs"/>
+      </a:defRPr>
+    </a:lvl3pPr>
+    <a:lvl4pPr marL="1371600" algn="l" defTabSz="914400" rtl="0" eaLnBrk="1" latinLnBrk="0" hangingPunct="1">
+      <a:defRPr sz="1200" kern="1200">
+        <a:solidFill>
+          <a:schemeClr val="tx1"/>
+        </a:solidFill>
+        <a:latin typeface="+mn-lt"/>
+        <a:ea typeface="+mn-ea"/>
+        <a:cs typeface="+mn-cs"/>
+      </a:defRPr>
+    </a:lvl4pPr>
+    <a:lvl5pPr marL="1828800" algn="l" defTabSz="914400" rtl="0" eaLnBrk="1" latinLnBrk="0" hangingPunct="1">
+      <a:defRPr sz="1200" kern="1200">
+        <a:solidFill>
+          <a:schemeClr val="tx1"/>
+        </a:solidFill>
+        <a:latin typeface="+mn-lt"/>
+        <a:ea typeface="+mn-ea"/>
+        <a:cs typeface="+mn-cs"/>
+      </a:defRPr>
+    </a:lvl5pPr>
+    <a:lvl6pPr marL="2286000" algn="l" defTabSz="914400" rtl="0" eaLnBrk="1" latinLnBrk="0" hangingPunct="1">
+      <a:defRPr sz="1200" kern="1200">
+        <a:solidFill>
+          <a:schemeClr val="tx1"/>
+        </a:solidFill>
+        <a:latin typeface="+mn-lt"/>
+        <a:ea typeface="+mn-ea"/>
+        <a:cs typeface="+mn-cs"/>
+      </a:defRPr>
+    </a:lvl6pPr>
+    <a:lvl7pPr marL="2743200" algn="l" defTabSz="914400" rtl="0" eaLnBrk="1" latinLnBrk="0" hangingPunct="1">
+      <a:defRPr sz="1200" kern="1200">
+        <a:solidFill>
+          <a:schemeClr val="tx1"/>
+        </a:solidFill>
+        <a:latin typeface="+mn-lt"/>
+        <a:ea typeface="+mn-ea"/>
+        <a:cs typeface="+mn-cs"/>
+      </a:defRPr>
+    </a:lvl7pPr>
+    <a:lvl8pPr marL="3200400" algn="l" defTabSz="914400" rtl="0" eaLnBrk="1" latinLnBrk="0" hangingPunct="1">
+      <a:defRPr sz="1200" kern="1200">
+        <a:solidFill>
+          <a:schemeClr val="tx1"/>
+        </a:solidFill>
+        <a:latin typeface="+mn-lt"/>
+        <a:ea typeface="+mn-ea"/>
+        <a:cs typeface="+mn-cs"/>
+      </a:defRPr>
+    </a:lvl8pPr>
+    <a:lvl9pPr marL="3657600" algn="l" defTabSz="914400" rtl="0" eaLnBrk="1" latinLnBrk="0" hangingPunct="1">
+      <a:defRPr sz="1200" kern="1200">
+        <a:solidFill>
+          <a:schemeClr val="tx1"/>
+        </a:solidFill>
+        <a:latin typeface="+mn-lt"/>
+        <a:ea typeface="+mn-ea"/>
+        <a:cs typeface="+mn-cs"/>
+      </a:defRPr>
+    </a:lvl9pPr>
+  </p:notesStyle>
+</p:notesMaster>
+</file>
+
+<file path=ppt/notesSlides/notesSlide1.xml><?xml version="1.0" encoding="utf-8"?>
+<p:notes xmlns:a="http://schemas.openxmlformats.org/drawingml/2006/main" xmlns:r="http://schemas.openxmlformats.org/officeDocument/2006/relationships" xmlns:p="http://schemas.openxmlformats.org/presentationml/2006/main">
+  <p:cSld>
+    <p:spTree>
+      <p:nvGrpSpPr>
+        <p:cNvPr id="1" name=""/>
+        <p:cNvGrpSpPr/>
+        <p:nvPr/>
+      </p:nvGrpSpPr>
+      <p:grpSpPr>
+        <a:xfrm>
+          <a:off x="0" y="0"/>
+          <a:ext cx="0" cy="0"/>
+          <a:chOff x="0" y="0"/>
+          <a:chExt cx="0" cy="0"/>
+        </a:xfrm>
+      </p:grpSpPr>
+      <p:sp>
+        <p:nvSpPr>
+          <p:cNvPr id="2" name="Slide Image Placeholder 1"/>
+          <p:cNvSpPr>
+            <a:spLocks noGrp="1" noRot="1" noChangeAspect="1"/>
+          </p:cNvSpPr>
+          <p:nvPr>
+            <p:ph type="sldImg"/>
+          </p:nvPr>
+        </p:nvSpPr>
+        <p:spPr/>
+      </p:sp>
+      <p:sp>
+        <p:nvSpPr>
+          <p:cNvPr id="3" name="Notes Placeholder 2"/>
+          <p:cNvSpPr>
+            <a:spLocks noGrp="1"/>
+          </p:cNvSpPr>
+          <p:nvPr>
+            <p:ph type="body" idx="1"/>
+          </p:nvPr>
+        </p:nvSpPr>
+        <p:spPr/>
+        <p:txBody>
+          <a:bodyPr/>
+          <a:lstStyle/>
+          <a:p>
+            <a:r>
+              <a:rPr lang="en-US" dirty="0"/>
+              <a:t>Source: http://www.typescriptlang.org/docs/handbook/classes.html</a:t>
+            </a:r>
+          </a:p>
+        </p:txBody>
+      </p:sp>
+      <p:sp>
+        <p:nvSpPr>
+          <p:cNvPr id="4" name="Slide Number Placeholder 3"/>
+          <p:cNvSpPr>
+            <a:spLocks noGrp="1"/>
+          </p:cNvSpPr>
+          <p:nvPr>
+            <p:ph type="sldNum" sz="quarter" idx="10"/>
+          </p:nvPr>
+        </p:nvSpPr>
+        <p:spPr/>
+        <p:txBody>
+          <a:bodyPr/>
+          <a:lstStyle/>
+          <a:p>
+            <a:fld id="{CBBECB81-0CD9-4382-87B9-38A0B5BD9646}" type="slidenum">
+              <a:rPr lang="en-US" smtClean="0"/>
+              <a:t>11</a:t>
+            </a:fld>
+            <a:endParaRPr lang="en-US"/>
+          </a:p>
+        </p:txBody>
+      </p:sp>
+    </p:spTree>
+    <p:extLst>
+      <p:ext uri="{BB962C8B-B14F-4D97-AF65-F5344CB8AC3E}">
+        <p14:creationId xmlns:p14="http://schemas.microsoft.com/office/powerpoint/2010/main" val="1754944912"/>
+      </p:ext>
+    </p:extLst>
+  </p:cSld>
+  <p:clrMapOvr>
+    <a:masterClrMapping/>
+  </p:clrMapOvr>
+</p:notes>
+</file>
+
+<file path=ppt/notesSlides/notesSlide2.xml><?xml version="1.0" encoding="utf-8"?>
+<p:notes xmlns:a="http://schemas.openxmlformats.org/drawingml/2006/main" xmlns:r="http://schemas.openxmlformats.org/officeDocument/2006/relationships" xmlns:p="http://schemas.openxmlformats.org/presentationml/2006/main">
+  <p:cSld>
+    <p:spTree>
+      <p:nvGrpSpPr>
+        <p:cNvPr id="1" name=""/>
+        <p:cNvGrpSpPr/>
+        <p:nvPr/>
+      </p:nvGrpSpPr>
+      <p:grpSpPr>
+        <a:xfrm>
+          <a:off x="0" y="0"/>
+          <a:ext cx="0" cy="0"/>
+          <a:chOff x="0" y="0"/>
+          <a:chExt cx="0" cy="0"/>
+        </a:xfrm>
+      </p:grpSpPr>
+      <p:sp>
+        <p:nvSpPr>
+          <p:cNvPr id="2" name="Slide Image Placeholder 1"/>
+          <p:cNvSpPr>
+            <a:spLocks noGrp="1" noRot="1" noChangeAspect="1"/>
+          </p:cNvSpPr>
+          <p:nvPr>
+            <p:ph type="sldImg"/>
+          </p:nvPr>
+        </p:nvSpPr>
+        <p:spPr/>
+      </p:sp>
+      <p:sp>
+        <p:nvSpPr>
+          <p:cNvPr id="3" name="Notes Placeholder 2"/>
+          <p:cNvSpPr>
+            <a:spLocks noGrp="1"/>
+          </p:cNvSpPr>
+          <p:nvPr>
+            <p:ph type="body" idx="1"/>
+          </p:nvPr>
+        </p:nvSpPr>
+        <p:spPr/>
+        <p:txBody>
+          <a:bodyPr/>
+          <a:lstStyle/>
+          <a:p>
+            <a:pPr marL="0" marR="0" indent="0" algn="l" defTabSz="914400" rtl="0" eaLnBrk="1" fontAlgn="auto" latinLnBrk="0" hangingPunct="1">
+              <a:lnSpc>
+                <a:spcPct val="100000"/>
+              </a:lnSpc>
+              <a:spcBef>
+                <a:spcPts val="0"/>
+              </a:spcBef>
+              <a:spcAft>
+                <a:spcPts val="0"/>
+              </a:spcAft>
+              <a:buClrTx/>
+              <a:buSzTx/>
+              <a:buFontTx/>
+              <a:buNone/>
+              <a:tabLst/>
+              <a:defRPr/>
+            </a:pPr>
+            <a:r>
+              <a:rPr lang="en-US" dirty="0"/>
+              <a:t>Source: http://www.typescriptlang.org/docs/handbook/classes.html</a:t>
+            </a:r>
+          </a:p>
+          <a:p>
+            <a:endParaRPr lang="en-US" dirty="0"/>
+          </a:p>
+        </p:txBody>
+      </p:sp>
+      <p:sp>
+        <p:nvSpPr>
+          <p:cNvPr id="4" name="Slide Number Placeholder 3"/>
+          <p:cNvSpPr>
+            <a:spLocks noGrp="1"/>
+          </p:cNvSpPr>
+          <p:nvPr>
+            <p:ph type="sldNum" sz="quarter" idx="10"/>
+          </p:nvPr>
+        </p:nvSpPr>
+        <p:spPr/>
+        <p:txBody>
+          <a:bodyPr/>
+          <a:lstStyle/>
+          <a:p>
+            <a:fld id="{CBBECB81-0CD9-4382-87B9-38A0B5BD9646}" type="slidenum">
+              <a:rPr lang="en-US" smtClean="0"/>
+              <a:t>12</a:t>
+            </a:fld>
+            <a:endParaRPr lang="en-US"/>
+          </a:p>
+        </p:txBody>
+      </p:sp>
+    </p:spTree>
+    <p:extLst>
+      <p:ext uri="{BB962C8B-B14F-4D97-AF65-F5344CB8AC3E}">
+        <p14:creationId xmlns:p14="http://schemas.microsoft.com/office/powerpoint/2010/main" val="2283630591"/>
+      </p:ext>
+    </p:extLst>
+  </p:cSld>
+  <p:clrMapOvr>
+    <a:masterClrMapping/>
+  </p:clrMapOvr>
+</p:notes>
+</file>
+
+<file path=ppt/notesSlides/notesSlide3.xml><?xml version="1.0" encoding="utf-8"?>
+<p:notes xmlns:a="http://schemas.openxmlformats.org/drawingml/2006/main" xmlns:r="http://schemas.openxmlformats.org/officeDocument/2006/relationships" xmlns:p="http://schemas.openxmlformats.org/presentationml/2006/main">
+  <p:cSld>
+    <p:spTree>
+      <p:nvGrpSpPr>
+        <p:cNvPr id="1" name=""/>
+        <p:cNvGrpSpPr/>
+        <p:nvPr/>
+      </p:nvGrpSpPr>
+      <p:grpSpPr>
+        <a:xfrm>
+          <a:off x="0" y="0"/>
+          <a:ext cx="0" cy="0"/>
+          <a:chOff x="0" y="0"/>
+          <a:chExt cx="0" cy="0"/>
+        </a:xfrm>
+      </p:grpSpPr>
+      <p:sp>
+        <p:nvSpPr>
+          <p:cNvPr id="2" name="Slide Image Placeholder 1"/>
+          <p:cNvSpPr>
+            <a:spLocks noGrp="1" noRot="1" noChangeAspect="1"/>
+          </p:cNvSpPr>
+          <p:nvPr>
+            <p:ph type="sldImg"/>
+          </p:nvPr>
+        </p:nvSpPr>
+        <p:spPr/>
+      </p:sp>
+      <p:sp>
+        <p:nvSpPr>
+          <p:cNvPr id="3" name="Notes Placeholder 2"/>
+          <p:cNvSpPr>
+            <a:spLocks noGrp="1"/>
+          </p:cNvSpPr>
+          <p:nvPr>
+            <p:ph type="body" idx="1"/>
+          </p:nvPr>
+        </p:nvSpPr>
+        <p:spPr/>
+        <p:txBody>
+          <a:bodyPr/>
+          <a:lstStyle/>
+          <a:p>
+            <a:pPr marL="0" marR="0" indent="0" algn="l" defTabSz="914400" rtl="0" eaLnBrk="1" fontAlgn="auto" latinLnBrk="0" hangingPunct="1">
+              <a:lnSpc>
+                <a:spcPct val="100000"/>
+              </a:lnSpc>
+              <a:spcBef>
+                <a:spcPts val="0"/>
+              </a:spcBef>
+              <a:spcAft>
+                <a:spcPts val="0"/>
+              </a:spcAft>
+              <a:buClrTx/>
+              <a:buSzTx/>
+              <a:buFontTx/>
+              <a:buNone/>
+              <a:tabLst/>
+              <a:defRPr/>
+            </a:pPr>
+            <a:r>
+              <a:rPr lang="en-US" dirty="0"/>
+              <a:t>Source: http://www.typescriptlang.org/docs/handbook/classes.html</a:t>
+            </a:r>
+          </a:p>
+          <a:p>
+            <a:endParaRPr lang="en-US" dirty="0"/>
+          </a:p>
+        </p:txBody>
+      </p:sp>
+      <p:sp>
+        <p:nvSpPr>
+          <p:cNvPr id="4" name="Slide Number Placeholder 3"/>
+          <p:cNvSpPr>
+            <a:spLocks noGrp="1"/>
+          </p:cNvSpPr>
+          <p:nvPr>
+            <p:ph type="sldNum" sz="quarter" idx="10"/>
+          </p:nvPr>
+        </p:nvSpPr>
+        <p:spPr/>
+        <p:txBody>
+          <a:bodyPr/>
+          <a:lstStyle/>
+          <a:p>
+            <a:fld id="{CBBECB81-0CD9-4382-87B9-38A0B5BD9646}" type="slidenum">
+              <a:rPr lang="en-US" smtClean="0"/>
+              <a:t>13</a:t>
+            </a:fld>
+            <a:endParaRPr lang="en-US"/>
+          </a:p>
+        </p:txBody>
+      </p:sp>
+    </p:spTree>
+    <p:extLst>
+      <p:ext uri="{BB962C8B-B14F-4D97-AF65-F5344CB8AC3E}">
+        <p14:creationId xmlns:p14="http://schemas.microsoft.com/office/powerpoint/2010/main" val="3192528382"/>
+      </p:ext>
+    </p:extLst>
+  </p:cSld>
+  <p:clrMapOvr>
+    <a:masterClrMapping/>
+  </p:clrMapOvr>
+</p:notes>
 </file>
 
 <file path=ppt/slideLayouts/slideLayout1.xml><?xml version="1.0" encoding="utf-8"?>
@@ -154,7 +827,6 @@
               <a:rPr lang="en-US"/>
               <a:t>Click to edit Master title style</a:t>
             </a:r>
-            <a:endParaRPr lang="en-US"/>
           </a:p>
         </p:txBody>
       </p:sp>
@@ -219,7 +891,6 @@
               <a:rPr lang="en-US"/>
               <a:t>Click to edit Master subtitle style</a:t>
             </a:r>
-            <a:endParaRPr lang="en-US"/>
           </a:p>
         </p:txBody>
       </p:sp>
@@ -240,7 +911,7 @@
           <a:p>
             <a:fld id="{ACCD170E-ED89-4DFB-A446-E28B7ED5E2CC}" type="datetimeFigureOut">
               <a:rPr lang="en-US" smtClean="0"/>
-              <a:t>5/13/2016</a:t>
+              <a:t>5/15/2016</a:t>
             </a:fld>
             <a:endParaRPr lang="en-US"/>
           </a:p>
@@ -337,7 +1008,6 @@
               <a:rPr lang="en-US"/>
               <a:t>Click to edit Master title style</a:t>
             </a:r>
-            <a:endParaRPr lang="en-US"/>
           </a:p>
         </p:txBody>
       </p:sp>
@@ -389,7 +1059,6 @@
               <a:rPr lang="en-US"/>
               <a:t>Fifth level</a:t>
             </a:r>
-            <a:endParaRPr lang="en-US"/>
           </a:p>
         </p:txBody>
       </p:sp>
@@ -410,7 +1079,7 @@
           <a:p>
             <a:fld id="{ACCD170E-ED89-4DFB-A446-E28B7ED5E2CC}" type="datetimeFigureOut">
               <a:rPr lang="en-US" smtClean="0"/>
-              <a:t>5/13/2016</a:t>
+              <a:t>5/15/2016</a:t>
             </a:fld>
             <a:endParaRPr lang="en-US"/>
           </a:p>
@@ -512,7 +1181,6 @@
               <a:rPr lang="en-US"/>
               <a:t>Click to edit Master title style</a:t>
             </a:r>
-            <a:endParaRPr lang="en-US"/>
           </a:p>
         </p:txBody>
       </p:sp>
@@ -569,7 +1237,6 @@
               <a:rPr lang="en-US"/>
               <a:t>Fifth level</a:t>
             </a:r>
-            <a:endParaRPr lang="en-US"/>
           </a:p>
         </p:txBody>
       </p:sp>
@@ -590,7 +1257,7 @@
           <a:p>
             <a:fld id="{ACCD170E-ED89-4DFB-A446-E28B7ED5E2CC}" type="datetimeFigureOut">
               <a:rPr lang="en-US" smtClean="0"/>
-              <a:t>5/13/2016</a:t>
+              <a:t>5/15/2016</a:t>
             </a:fld>
             <a:endParaRPr lang="en-US"/>
           </a:p>
@@ -687,7 +1354,6 @@
               <a:rPr lang="en-US"/>
               <a:t>Click to edit Master title style</a:t>
             </a:r>
-            <a:endParaRPr lang="en-US"/>
           </a:p>
         </p:txBody>
       </p:sp>
@@ -739,7 +1405,6 @@
               <a:rPr lang="en-US"/>
               <a:t>Fifth level</a:t>
             </a:r>
-            <a:endParaRPr lang="en-US"/>
           </a:p>
         </p:txBody>
       </p:sp>
@@ -760,7 +1425,7 @@
           <a:p>
             <a:fld id="{ACCD170E-ED89-4DFB-A446-E28B7ED5E2CC}" type="datetimeFigureOut">
               <a:rPr lang="en-US" smtClean="0"/>
-              <a:t>5/13/2016</a:t>
+              <a:t>5/15/2016</a:t>
             </a:fld>
             <a:endParaRPr lang="en-US"/>
           </a:p>
@@ -866,7 +1531,6 @@
               <a:rPr lang="en-US"/>
               <a:t>Click to edit Master title style</a:t>
             </a:r>
-            <a:endParaRPr lang="en-US"/>
           </a:p>
         </p:txBody>
       </p:sp>
@@ -1006,7 +1670,7 @@
           <a:p>
             <a:fld id="{ACCD170E-ED89-4DFB-A446-E28B7ED5E2CC}" type="datetimeFigureOut">
               <a:rPr lang="en-US" smtClean="0"/>
-              <a:t>5/13/2016</a:t>
+              <a:t>5/15/2016</a:t>
             </a:fld>
             <a:endParaRPr lang="en-US"/>
           </a:p>
@@ -1103,7 +1767,6 @@
               <a:rPr lang="en-US"/>
               <a:t>Click to edit Master title style</a:t>
             </a:r>
-            <a:endParaRPr lang="en-US"/>
           </a:p>
         </p:txBody>
       </p:sp>
@@ -1160,7 +1823,6 @@
               <a:rPr lang="en-US"/>
               <a:t>Fifth level</a:t>
             </a:r>
-            <a:endParaRPr lang="en-US"/>
           </a:p>
         </p:txBody>
       </p:sp>
@@ -1217,7 +1879,6 @@
               <a:rPr lang="en-US"/>
               <a:t>Fifth level</a:t>
             </a:r>
-            <a:endParaRPr lang="en-US"/>
           </a:p>
         </p:txBody>
       </p:sp>
@@ -1238,7 +1899,7 @@
           <a:p>
             <a:fld id="{ACCD170E-ED89-4DFB-A446-E28B7ED5E2CC}" type="datetimeFigureOut">
               <a:rPr lang="en-US" smtClean="0"/>
-              <a:t>5/13/2016</a:t>
+              <a:t>5/15/2016</a:t>
             </a:fld>
             <a:endParaRPr lang="en-US"/>
           </a:p>
@@ -1340,7 +2001,6 @@
               <a:rPr lang="en-US"/>
               <a:t>Click to edit Master title style</a:t>
             </a:r>
-            <a:endParaRPr lang="en-US"/>
           </a:p>
         </p:txBody>
       </p:sp>
@@ -1462,7 +2122,6 @@
               <a:rPr lang="en-US"/>
               <a:t>Fifth level</a:t>
             </a:r>
-            <a:endParaRPr lang="en-US"/>
           </a:p>
         </p:txBody>
       </p:sp>
@@ -1584,7 +2243,6 @@
               <a:rPr lang="en-US"/>
               <a:t>Fifth level</a:t>
             </a:r>
-            <a:endParaRPr lang="en-US"/>
           </a:p>
         </p:txBody>
       </p:sp>
@@ -1605,7 +2263,7 @@
           <a:p>
             <a:fld id="{ACCD170E-ED89-4DFB-A446-E28B7ED5E2CC}" type="datetimeFigureOut">
               <a:rPr lang="en-US" smtClean="0"/>
-              <a:t>5/13/2016</a:t>
+              <a:t>5/15/2016</a:t>
             </a:fld>
             <a:endParaRPr lang="en-US"/>
           </a:p>
@@ -1702,7 +2360,6 @@
               <a:rPr lang="en-US"/>
               <a:t>Click to edit Master title style</a:t>
             </a:r>
-            <a:endParaRPr lang="en-US"/>
           </a:p>
         </p:txBody>
       </p:sp>
@@ -1723,7 +2380,7 @@
           <a:p>
             <a:fld id="{ACCD170E-ED89-4DFB-A446-E28B7ED5E2CC}" type="datetimeFigureOut">
               <a:rPr lang="en-US" smtClean="0"/>
-              <a:t>5/13/2016</a:t>
+              <a:t>5/15/2016</a:t>
             </a:fld>
             <a:endParaRPr lang="en-US"/>
           </a:p>
@@ -1818,7 +2475,7 @@
           <a:p>
             <a:fld id="{ACCD170E-ED89-4DFB-A446-E28B7ED5E2CC}" type="datetimeFigureOut">
               <a:rPr lang="en-US" smtClean="0"/>
-              <a:t>5/13/2016</a:t>
+              <a:t>5/15/2016</a:t>
             </a:fld>
             <a:endParaRPr lang="en-US"/>
           </a:p>
@@ -1924,7 +2581,6 @@
               <a:rPr lang="en-US"/>
               <a:t>Click to edit Master title style</a:t>
             </a:r>
-            <a:endParaRPr lang="en-US"/>
           </a:p>
         </p:txBody>
       </p:sp>
@@ -2009,7 +2665,6 @@
               <a:rPr lang="en-US"/>
               <a:t>Fifth level</a:t>
             </a:r>
-            <a:endParaRPr lang="en-US"/>
           </a:p>
         </p:txBody>
       </p:sp>
@@ -2095,7 +2750,7 @@
           <a:p>
             <a:fld id="{ACCD170E-ED89-4DFB-A446-E28B7ED5E2CC}" type="datetimeFigureOut">
               <a:rPr lang="en-US" smtClean="0"/>
-              <a:t>5/13/2016</a:t>
+              <a:t>5/15/2016</a:t>
             </a:fld>
             <a:endParaRPr lang="en-US"/>
           </a:p>
@@ -2201,7 +2856,6 @@
               <a:rPr lang="en-US"/>
               <a:t>Click to edit Master title style</a:t>
             </a:r>
-            <a:endParaRPr lang="en-US"/>
           </a:p>
         </p:txBody>
       </p:sp>
@@ -2348,7 +3002,7 @@
           <a:p>
             <a:fld id="{ACCD170E-ED89-4DFB-A446-E28B7ED5E2CC}" type="datetimeFigureOut">
               <a:rPr lang="en-US" smtClean="0"/>
-              <a:t>5/13/2016</a:t>
+              <a:t>5/15/2016</a:t>
             </a:fld>
             <a:endParaRPr lang="en-US"/>
           </a:p>
@@ -2460,7 +3114,6 @@
               <a:rPr lang="en-US"/>
               <a:t>Click to edit Master title style</a:t>
             </a:r>
-            <a:endParaRPr lang="en-US"/>
           </a:p>
         </p:txBody>
       </p:sp>
@@ -2522,7 +3175,6 @@
               <a:rPr lang="en-US"/>
               <a:t>Fifth level</a:t>
             </a:r>
-            <a:endParaRPr lang="en-US"/>
           </a:p>
         </p:txBody>
       </p:sp>
@@ -2561,7 +3213,7 @@
           <a:p>
             <a:fld id="{ACCD170E-ED89-4DFB-A446-E28B7ED5E2CC}" type="datetimeFigureOut">
               <a:rPr lang="en-US" smtClean="0"/>
-              <a:t>5/13/2016</a:t>
+              <a:t>5/15/2016</a:t>
             </a:fld>
             <a:endParaRPr lang="en-US"/>
           </a:p>
@@ -2982,6 +3634,10 @@
           <a:lstStyle/>
           <a:p>
             <a:r>
+              <a:rPr lang="en-US" dirty="0"/>
+              <a:t>Intro to </a:t>
+            </a:r>
+            <a:r>
               <a:rPr lang="en-US" dirty="0" err="1"/>
               <a:t>TypeScript</a:t>
             </a:r>
@@ -3004,7 +3660,10 @@
           <a:bodyPr/>
           <a:lstStyle/>
           <a:p>
-            <a:endParaRPr lang="en-US"/>
+            <a:r>
+              <a:rPr lang="en-US" dirty="0"/>
+              <a:t>Spencer Schneidenbach</a:t>
+            </a:r>
           </a:p>
         </p:txBody>
       </p:sp>
@@ -3012,6 +3671,1445 @@
     <p:extLst>
       <p:ext uri="{BB962C8B-B14F-4D97-AF65-F5344CB8AC3E}">
         <p14:creationId xmlns:p14="http://schemas.microsoft.com/office/powerpoint/2010/main" val="1492643342"/>
+      </p:ext>
+    </p:extLst>
+  </p:cSld>
+  <p:clrMapOvr>
+    <a:masterClrMapping/>
+  </p:clrMapOvr>
+</p:sld>
+</file>
+
+<file path=ppt/slides/slide10.xml><?xml version="1.0" encoding="utf-8"?>
+<p:sld xmlns:a="http://schemas.openxmlformats.org/drawingml/2006/main" xmlns:r="http://schemas.openxmlformats.org/officeDocument/2006/relationships" xmlns:p="http://schemas.openxmlformats.org/presentationml/2006/main">
+  <p:cSld>
+    <p:spTree>
+      <p:nvGrpSpPr>
+        <p:cNvPr id="1" name=""/>
+        <p:cNvGrpSpPr/>
+        <p:nvPr/>
+      </p:nvGrpSpPr>
+      <p:grpSpPr>
+        <a:xfrm>
+          <a:off x="0" y="0"/>
+          <a:ext cx="0" cy="0"/>
+          <a:chOff x="0" y="0"/>
+          <a:chExt cx="0" cy="0"/>
+        </a:xfrm>
+      </p:grpSpPr>
+      <p:sp>
+        <p:nvSpPr>
+          <p:cNvPr id="2" name="Title 1"/>
+          <p:cNvSpPr>
+            <a:spLocks noGrp="1"/>
+          </p:cNvSpPr>
+          <p:nvPr>
+            <p:ph type="title"/>
+          </p:nvPr>
+        </p:nvSpPr>
+        <p:spPr/>
+        <p:txBody>
+          <a:bodyPr/>
+          <a:lstStyle/>
+          <a:p>
+            <a:r>
+              <a:rPr lang="en-US" dirty="0"/>
+              <a:t>More interfaces</a:t>
+            </a:r>
+          </a:p>
+        </p:txBody>
+      </p:sp>
+      <p:sp>
+        <p:nvSpPr>
+          <p:cNvPr id="3" name="Content Placeholder 2"/>
+          <p:cNvSpPr>
+            <a:spLocks noGrp="1"/>
+          </p:cNvSpPr>
+          <p:nvPr>
+            <p:ph idx="1"/>
+          </p:nvPr>
+        </p:nvSpPr>
+        <p:spPr>
+          <a:xfrm>
+            <a:off x="838200" y="1433945"/>
+            <a:ext cx="10515600" cy="4743018"/>
+          </a:xfrm>
+        </p:spPr>
+        <p:txBody>
+          <a:bodyPr/>
+          <a:lstStyle/>
+          <a:p>
+            <a:r>
+              <a:rPr lang="en-US" dirty="0"/>
+              <a:t>Duck typing: “If it walks like a duck and quacks like a duck… it’s a duck”</a:t>
+            </a:r>
+          </a:p>
+          <a:p>
+            <a:endParaRPr lang="en-US" dirty="0"/>
+          </a:p>
+          <a:p>
+            <a:endParaRPr lang="en-US" dirty="0"/>
+          </a:p>
+          <a:p>
+            <a:endParaRPr lang="en-US" dirty="0"/>
+          </a:p>
+          <a:p>
+            <a:endParaRPr lang="en-US" dirty="0"/>
+          </a:p>
+          <a:p>
+            <a:endParaRPr lang="en-US" dirty="0"/>
+          </a:p>
+          <a:p>
+            <a:endParaRPr lang="en-US" dirty="0"/>
+          </a:p>
+          <a:p>
+            <a:r>
+              <a:rPr lang="en-US" dirty="0"/>
+              <a:t>This is valid!</a:t>
+            </a:r>
+          </a:p>
+        </p:txBody>
+      </p:sp>
+      <p:pic>
+        <p:nvPicPr>
+          <p:cNvPr id="4" name="Picture 3"/>
+          <p:cNvPicPr>
+            <a:picLocks noChangeAspect="1"/>
+          </p:cNvPicPr>
+          <p:nvPr/>
+        </p:nvPicPr>
+        <p:blipFill>
+          <a:blip r:embed="rId2"/>
+          <a:stretch>
+            <a:fillRect/>
+          </a:stretch>
+        </p:blipFill>
+        <p:spPr>
+          <a:xfrm>
+            <a:off x="1575295" y="2759508"/>
+            <a:ext cx="9220859" cy="2313136"/>
+          </a:xfrm>
+          <a:prstGeom prst="rect">
+            <a:avLst/>
+          </a:prstGeom>
+        </p:spPr>
+      </p:pic>
+    </p:spTree>
+    <p:extLst>
+      <p:ext uri="{BB962C8B-B14F-4D97-AF65-F5344CB8AC3E}">
+        <p14:creationId xmlns:p14="http://schemas.microsoft.com/office/powerpoint/2010/main" val="89513061"/>
+      </p:ext>
+    </p:extLst>
+  </p:cSld>
+  <p:clrMapOvr>
+    <a:masterClrMapping/>
+  </p:clrMapOvr>
+  <p:timing>
+    <p:tnLst>
+      <p:par>
+        <p:cTn id="1" dur="indefinite" restart="never" nodeType="tmRoot">
+          <p:childTnLst>
+            <p:seq concurrent="1" nextAc="seek">
+              <p:cTn id="2" dur="indefinite" nodeType="mainSeq">
+                <p:childTnLst>
+                  <p:par>
+                    <p:cTn id="3" fill="hold">
+                      <p:stCondLst>
+                        <p:cond delay="indefinite"/>
+                      </p:stCondLst>
+                      <p:childTnLst>
+                        <p:par>
+                          <p:cTn id="4" fill="hold">
+                            <p:stCondLst>
+                              <p:cond delay="0"/>
+                            </p:stCondLst>
+                            <p:childTnLst>
+                              <p:par>
+                                <p:cTn id="5" presetID="1" presetClass="entr" presetSubtype="0" fill="hold" grpId="0" nodeType="clickEffect">
+                                  <p:stCondLst>
+                                    <p:cond delay="0"/>
+                                  </p:stCondLst>
+                                  <p:childTnLst>
+                                    <p:set>
+                                      <p:cBhvr>
+                                        <p:cTn id="6" dur="1" fill="hold">
+                                          <p:stCondLst>
+                                            <p:cond delay="0"/>
+                                          </p:stCondLst>
+                                        </p:cTn>
+                                        <p:tgtEl>
+                                          <p:spTgt spid="3">
+                                            <p:txEl>
+                                              <p:pRg st="0" end="0"/>
+                                            </p:txEl>
+                                          </p:spTgt>
+                                        </p:tgtEl>
+                                        <p:attrNameLst>
+                                          <p:attrName>style.visibility</p:attrName>
+                                        </p:attrNameLst>
+                                      </p:cBhvr>
+                                      <p:to>
+                                        <p:strVal val="visible"/>
+                                      </p:to>
+                                    </p:set>
+                                  </p:childTnLst>
+                                </p:cTn>
+                              </p:par>
+                            </p:childTnLst>
+                          </p:cTn>
+                        </p:par>
+                      </p:childTnLst>
+                    </p:cTn>
+                  </p:par>
+                  <p:par>
+                    <p:cTn id="7" fill="hold">
+                      <p:stCondLst>
+                        <p:cond delay="indefinite"/>
+                      </p:stCondLst>
+                      <p:childTnLst>
+                        <p:par>
+                          <p:cTn id="8" fill="hold">
+                            <p:stCondLst>
+                              <p:cond delay="0"/>
+                            </p:stCondLst>
+                            <p:childTnLst>
+                              <p:par>
+                                <p:cTn id="9" presetID="1" presetClass="entr" presetSubtype="0" fill="hold" nodeType="clickEffect">
+                                  <p:stCondLst>
+                                    <p:cond delay="0"/>
+                                  </p:stCondLst>
+                                  <p:childTnLst>
+                                    <p:set>
+                                      <p:cBhvr>
+                                        <p:cTn id="10" dur="1" fill="hold">
+                                          <p:stCondLst>
+                                            <p:cond delay="0"/>
+                                          </p:stCondLst>
+                                        </p:cTn>
+                                        <p:tgtEl>
+                                          <p:spTgt spid="4"/>
+                                        </p:tgtEl>
+                                        <p:attrNameLst>
+                                          <p:attrName>style.visibility</p:attrName>
+                                        </p:attrNameLst>
+                                      </p:cBhvr>
+                                      <p:to>
+                                        <p:strVal val="visible"/>
+                                      </p:to>
+                                    </p:set>
+                                  </p:childTnLst>
+                                </p:cTn>
+                              </p:par>
+                              <p:par>
+                                <p:cTn id="11" presetID="1" presetClass="entr" presetSubtype="0" fill="hold" grpId="0" nodeType="withEffect">
+                                  <p:stCondLst>
+                                    <p:cond delay="0"/>
+                                  </p:stCondLst>
+                                  <p:childTnLst>
+                                    <p:set>
+                                      <p:cBhvr>
+                                        <p:cTn id="12" dur="1" fill="hold">
+                                          <p:stCondLst>
+                                            <p:cond delay="0"/>
+                                          </p:stCondLst>
+                                        </p:cTn>
+                                        <p:tgtEl>
+                                          <p:spTgt spid="3">
+                                            <p:txEl>
+                                              <p:pRg st="7" end="7"/>
+                                            </p:txEl>
+                                          </p:spTgt>
+                                        </p:tgtEl>
+                                        <p:attrNameLst>
+                                          <p:attrName>style.visibility</p:attrName>
+                                        </p:attrNameLst>
+                                      </p:cBhvr>
+                                      <p:to>
+                                        <p:strVal val="visible"/>
+                                      </p:to>
+                                    </p:set>
+                                  </p:childTnLst>
+                                </p:cTn>
+                              </p:par>
+                            </p:childTnLst>
+                          </p:cTn>
+                        </p:par>
+                      </p:childTnLst>
+                    </p:cTn>
+                  </p:par>
+                </p:childTnLst>
+              </p:cTn>
+              <p:prevCondLst>
+                <p:cond evt="onPrev" delay="0">
+                  <p:tgtEl>
+                    <p:sldTgt/>
+                  </p:tgtEl>
+                </p:cond>
+              </p:prevCondLst>
+              <p:nextCondLst>
+                <p:cond evt="onNext" delay="0">
+                  <p:tgtEl>
+                    <p:sldTgt/>
+                  </p:tgtEl>
+                </p:cond>
+              </p:nextCondLst>
+            </p:seq>
+          </p:childTnLst>
+        </p:cTn>
+      </p:par>
+    </p:tnLst>
+    <p:bldLst>
+      <p:bldP spid="3" grpId="0" uiExpand="1" build="p"/>
+    </p:bldLst>
+  </p:timing>
+</p:sld>
+</file>
+
+<file path=ppt/slides/slide11.xml><?xml version="1.0" encoding="utf-8"?>
+<p:sld xmlns:a="http://schemas.openxmlformats.org/drawingml/2006/main" xmlns:r="http://schemas.openxmlformats.org/officeDocument/2006/relationships" xmlns:p="http://schemas.openxmlformats.org/presentationml/2006/main">
+  <p:cSld>
+    <p:spTree>
+      <p:nvGrpSpPr>
+        <p:cNvPr id="1" name=""/>
+        <p:cNvGrpSpPr/>
+        <p:nvPr/>
+      </p:nvGrpSpPr>
+      <p:grpSpPr>
+        <a:xfrm>
+          <a:off x="0" y="0"/>
+          <a:ext cx="0" cy="0"/>
+          <a:chOff x="0" y="0"/>
+          <a:chExt cx="0" cy="0"/>
+        </a:xfrm>
+      </p:grpSpPr>
+      <p:sp>
+        <p:nvSpPr>
+          <p:cNvPr id="2" name="Title 1"/>
+          <p:cNvSpPr>
+            <a:spLocks noGrp="1"/>
+          </p:cNvSpPr>
+          <p:nvPr>
+            <p:ph type="title"/>
+          </p:nvPr>
+        </p:nvSpPr>
+        <p:spPr/>
+        <p:txBody>
+          <a:bodyPr/>
+          <a:lstStyle/>
+          <a:p>
+            <a:r>
+              <a:rPr lang="en-US" dirty="0"/>
+              <a:t>Classes</a:t>
+            </a:r>
+          </a:p>
+        </p:txBody>
+      </p:sp>
+      <p:sp>
+        <p:nvSpPr>
+          <p:cNvPr id="3" name="Content Placeholder 2"/>
+          <p:cNvSpPr>
+            <a:spLocks noGrp="1"/>
+          </p:cNvSpPr>
+          <p:nvPr>
+            <p:ph idx="1"/>
+          </p:nvPr>
+        </p:nvSpPr>
+        <p:spPr>
+          <a:xfrm>
+            <a:off x="838200" y="1402773"/>
+            <a:ext cx="10515600" cy="4774190"/>
+          </a:xfrm>
+        </p:spPr>
+        <p:txBody>
+          <a:bodyPr/>
+          <a:lstStyle/>
+          <a:p>
+            <a:r>
+              <a:rPr lang="en-US" dirty="0"/>
+              <a:t>Classes can define behaviors AND properties</a:t>
+            </a:r>
+          </a:p>
+        </p:txBody>
+      </p:sp>
+      <p:pic>
+        <p:nvPicPr>
+          <p:cNvPr id="4" name="Picture 3"/>
+          <p:cNvPicPr>
+            <a:picLocks noChangeAspect="1"/>
+          </p:cNvPicPr>
+          <p:nvPr/>
+        </p:nvPicPr>
+        <p:blipFill>
+          <a:blip r:embed="rId3"/>
+          <a:stretch>
+            <a:fillRect/>
+          </a:stretch>
+        </p:blipFill>
+        <p:spPr>
+          <a:xfrm>
+            <a:off x="805630" y="2213263"/>
+            <a:ext cx="11195870" cy="3963699"/>
+          </a:xfrm>
+          <a:prstGeom prst="rect">
+            <a:avLst/>
+          </a:prstGeom>
+        </p:spPr>
+      </p:pic>
+    </p:spTree>
+    <p:extLst>
+      <p:ext uri="{BB962C8B-B14F-4D97-AF65-F5344CB8AC3E}">
+        <p14:creationId xmlns:p14="http://schemas.microsoft.com/office/powerpoint/2010/main" val="3867084399"/>
+      </p:ext>
+    </p:extLst>
+  </p:cSld>
+  <p:clrMapOvr>
+    <a:masterClrMapping/>
+  </p:clrMapOvr>
+</p:sld>
+</file>
+
+<file path=ppt/slides/slide12.xml><?xml version="1.0" encoding="utf-8"?>
+<p:sld xmlns:a="http://schemas.openxmlformats.org/drawingml/2006/main" xmlns:r="http://schemas.openxmlformats.org/officeDocument/2006/relationships" xmlns:p="http://schemas.openxmlformats.org/presentationml/2006/main">
+  <p:cSld>
+    <p:spTree>
+      <p:nvGrpSpPr>
+        <p:cNvPr id="1" name=""/>
+        <p:cNvGrpSpPr/>
+        <p:nvPr/>
+      </p:nvGrpSpPr>
+      <p:grpSpPr>
+        <a:xfrm>
+          <a:off x="0" y="0"/>
+          <a:ext cx="0" cy="0"/>
+          <a:chOff x="0" y="0"/>
+          <a:chExt cx="0" cy="0"/>
+        </a:xfrm>
+      </p:grpSpPr>
+      <p:sp>
+        <p:nvSpPr>
+          <p:cNvPr id="2" name="Title 1"/>
+          <p:cNvSpPr>
+            <a:spLocks noGrp="1"/>
+          </p:cNvSpPr>
+          <p:nvPr>
+            <p:ph type="title"/>
+          </p:nvPr>
+        </p:nvSpPr>
+        <p:spPr>
+          <a:xfrm>
+            <a:off x="838200" y="365125"/>
+            <a:ext cx="10515600" cy="985693"/>
+          </a:xfrm>
+        </p:spPr>
+        <p:txBody>
+          <a:bodyPr/>
+          <a:lstStyle/>
+          <a:p>
+            <a:r>
+              <a:rPr lang="en-US" dirty="0"/>
+              <a:t>Classes, cont’d</a:t>
+            </a:r>
+          </a:p>
+        </p:txBody>
+      </p:sp>
+      <p:sp>
+        <p:nvSpPr>
+          <p:cNvPr id="3" name="Content Placeholder 2"/>
+          <p:cNvSpPr>
+            <a:spLocks noGrp="1"/>
+          </p:cNvSpPr>
+          <p:nvPr>
+            <p:ph idx="1"/>
+          </p:nvPr>
+        </p:nvSpPr>
+        <p:spPr>
+          <a:xfrm>
+            <a:off x="838200" y="1350818"/>
+            <a:ext cx="10515600" cy="4826145"/>
+          </a:xfrm>
+        </p:spPr>
+        <p:txBody>
+          <a:bodyPr/>
+          <a:lstStyle/>
+          <a:p>
+            <a:r>
+              <a:rPr lang="en-US" dirty="0"/>
+              <a:t>Inheritance is a thing</a:t>
+            </a:r>
+          </a:p>
+          <a:p>
+            <a:endParaRPr lang="en-US" dirty="0"/>
+          </a:p>
+        </p:txBody>
+      </p:sp>
+      <p:pic>
+        <p:nvPicPr>
+          <p:cNvPr id="4" name="Picture 3"/>
+          <p:cNvPicPr>
+            <a:picLocks noChangeAspect="1"/>
+          </p:cNvPicPr>
+          <p:nvPr/>
+        </p:nvPicPr>
+        <p:blipFill>
+          <a:blip r:embed="rId3"/>
+          <a:stretch>
+            <a:fillRect/>
+          </a:stretch>
+        </p:blipFill>
+        <p:spPr>
+          <a:xfrm>
+            <a:off x="1252806" y="1865168"/>
+            <a:ext cx="6981825" cy="4629150"/>
+          </a:xfrm>
+          <a:prstGeom prst="rect">
+            <a:avLst/>
+          </a:prstGeom>
+        </p:spPr>
+      </p:pic>
+    </p:spTree>
+    <p:extLst>
+      <p:ext uri="{BB962C8B-B14F-4D97-AF65-F5344CB8AC3E}">
+        <p14:creationId xmlns:p14="http://schemas.microsoft.com/office/powerpoint/2010/main" val="2260550289"/>
+      </p:ext>
+    </p:extLst>
+  </p:cSld>
+  <p:clrMapOvr>
+    <a:masterClrMapping/>
+  </p:clrMapOvr>
+</p:sld>
+</file>
+
+<file path=ppt/slides/slide13.xml><?xml version="1.0" encoding="utf-8"?>
+<p:sld xmlns:a="http://schemas.openxmlformats.org/drawingml/2006/main" xmlns:r="http://schemas.openxmlformats.org/officeDocument/2006/relationships" xmlns:p="http://schemas.openxmlformats.org/presentationml/2006/main">
+  <p:cSld>
+    <p:spTree>
+      <p:nvGrpSpPr>
+        <p:cNvPr id="1" name=""/>
+        <p:cNvGrpSpPr/>
+        <p:nvPr/>
+      </p:nvGrpSpPr>
+      <p:grpSpPr>
+        <a:xfrm>
+          <a:off x="0" y="0"/>
+          <a:ext cx="0" cy="0"/>
+          <a:chOff x="0" y="0"/>
+          <a:chExt cx="0" cy="0"/>
+        </a:xfrm>
+      </p:grpSpPr>
+      <p:sp>
+        <p:nvSpPr>
+          <p:cNvPr id="2" name="Title 1"/>
+          <p:cNvSpPr>
+            <a:spLocks noGrp="1"/>
+          </p:cNvSpPr>
+          <p:nvPr>
+            <p:ph type="title"/>
+          </p:nvPr>
+        </p:nvSpPr>
+        <p:spPr>
+          <a:xfrm>
+            <a:off x="838200" y="365125"/>
+            <a:ext cx="10515600" cy="985693"/>
+          </a:xfrm>
+        </p:spPr>
+        <p:txBody>
+          <a:bodyPr/>
+          <a:lstStyle/>
+          <a:p>
+            <a:r>
+              <a:rPr lang="en-US" dirty="0"/>
+              <a:t>Using classes</a:t>
+            </a:r>
+          </a:p>
+        </p:txBody>
+      </p:sp>
+      <p:pic>
+        <p:nvPicPr>
+          <p:cNvPr id="4" name="Content Placeholder 3"/>
+          <p:cNvPicPr>
+            <a:picLocks noGrp="1" noChangeAspect="1"/>
+          </p:cNvPicPr>
+          <p:nvPr>
+            <p:ph idx="1"/>
+          </p:nvPr>
+        </p:nvPicPr>
+        <p:blipFill>
+          <a:blip r:embed="rId3"/>
+          <a:stretch>
+            <a:fillRect/>
+          </a:stretch>
+        </p:blipFill>
+        <p:spPr>
+          <a:xfrm>
+            <a:off x="986270" y="1784638"/>
+            <a:ext cx="10591775" cy="2631497"/>
+          </a:xfrm>
+          <a:prstGeom prst="rect">
+            <a:avLst/>
+          </a:prstGeom>
+        </p:spPr>
+      </p:pic>
+    </p:spTree>
+    <p:extLst>
+      <p:ext uri="{BB962C8B-B14F-4D97-AF65-F5344CB8AC3E}">
+        <p14:creationId xmlns:p14="http://schemas.microsoft.com/office/powerpoint/2010/main" val="2722674437"/>
+      </p:ext>
+    </p:extLst>
+  </p:cSld>
+  <p:clrMapOvr>
+    <a:masterClrMapping/>
+  </p:clrMapOvr>
+</p:sld>
+</file>
+
+<file path=ppt/slides/slide14.xml><?xml version="1.0" encoding="utf-8"?>
+<p:sld xmlns:a="http://schemas.openxmlformats.org/drawingml/2006/main" xmlns:r="http://schemas.openxmlformats.org/officeDocument/2006/relationships" xmlns:p="http://schemas.openxmlformats.org/presentationml/2006/main">
+  <p:cSld>
+    <p:spTree>
+      <p:nvGrpSpPr>
+        <p:cNvPr id="1" name=""/>
+        <p:cNvGrpSpPr/>
+        <p:nvPr/>
+      </p:nvGrpSpPr>
+      <p:grpSpPr>
+        <a:xfrm>
+          <a:off x="0" y="0"/>
+          <a:ext cx="0" cy="0"/>
+          <a:chOff x="0" y="0"/>
+          <a:chExt cx="0" cy="0"/>
+        </a:xfrm>
+      </p:grpSpPr>
+      <p:sp>
+        <p:nvSpPr>
+          <p:cNvPr id="2" name="Title 1"/>
+          <p:cNvSpPr>
+            <a:spLocks noGrp="1"/>
+          </p:cNvSpPr>
+          <p:nvPr>
+            <p:ph type="title"/>
+          </p:nvPr>
+        </p:nvSpPr>
+        <p:spPr/>
+        <p:txBody>
+          <a:bodyPr/>
+          <a:lstStyle/>
+          <a:p>
+            <a:r>
+              <a:rPr lang="en-US" dirty="0"/>
+              <a:t>Functions</a:t>
+            </a:r>
+          </a:p>
+        </p:txBody>
+      </p:sp>
+      <p:sp>
+        <p:nvSpPr>
+          <p:cNvPr id="3" name="Content Placeholder 2"/>
+          <p:cNvSpPr>
+            <a:spLocks noGrp="1"/>
+          </p:cNvSpPr>
+          <p:nvPr>
+            <p:ph idx="1"/>
+          </p:nvPr>
+        </p:nvSpPr>
+        <p:spPr>
+          <a:xfrm>
+            <a:off x="838200" y="1454727"/>
+            <a:ext cx="10515600" cy="4722236"/>
+          </a:xfrm>
+        </p:spPr>
+        <p:txBody>
+          <a:bodyPr/>
+          <a:lstStyle/>
+          <a:p>
+            <a:r>
+              <a:rPr lang="en-US" dirty="0"/>
+              <a:t>Perform actions</a:t>
+            </a:r>
+          </a:p>
+        </p:txBody>
+      </p:sp>
+      <p:pic>
+        <p:nvPicPr>
+          <p:cNvPr id="4" name="Picture 3"/>
+          <p:cNvPicPr>
+            <a:picLocks noChangeAspect="1"/>
+          </p:cNvPicPr>
+          <p:nvPr/>
+        </p:nvPicPr>
+        <p:blipFill>
+          <a:blip r:embed="rId2"/>
+          <a:stretch>
+            <a:fillRect/>
+          </a:stretch>
+        </p:blipFill>
+        <p:spPr>
+          <a:xfrm>
+            <a:off x="1153831" y="2007159"/>
+            <a:ext cx="7376240" cy="4169804"/>
+          </a:xfrm>
+          <a:prstGeom prst="rect">
+            <a:avLst/>
+          </a:prstGeom>
+        </p:spPr>
+      </p:pic>
+    </p:spTree>
+    <p:extLst>
+      <p:ext uri="{BB962C8B-B14F-4D97-AF65-F5344CB8AC3E}">
+        <p14:creationId xmlns:p14="http://schemas.microsoft.com/office/powerpoint/2010/main" val="2991871453"/>
+      </p:ext>
+    </p:extLst>
+  </p:cSld>
+  <p:clrMapOvr>
+    <a:masterClrMapping/>
+  </p:clrMapOvr>
+</p:sld>
+</file>
+
+<file path=ppt/slides/slide15.xml><?xml version="1.0" encoding="utf-8"?>
+<p:sld xmlns:a="http://schemas.openxmlformats.org/drawingml/2006/main" xmlns:r="http://schemas.openxmlformats.org/officeDocument/2006/relationships" xmlns:p="http://schemas.openxmlformats.org/presentationml/2006/main">
+  <p:cSld>
+    <p:spTree>
+      <p:nvGrpSpPr>
+        <p:cNvPr id="1" name=""/>
+        <p:cNvGrpSpPr/>
+        <p:nvPr/>
+      </p:nvGrpSpPr>
+      <p:grpSpPr>
+        <a:xfrm>
+          <a:off x="0" y="0"/>
+          <a:ext cx="0" cy="0"/>
+          <a:chOff x="0" y="0"/>
+          <a:chExt cx="0" cy="0"/>
+        </a:xfrm>
+      </p:grpSpPr>
+      <p:sp>
+        <p:nvSpPr>
+          <p:cNvPr id="2" name="Title 1"/>
+          <p:cNvSpPr>
+            <a:spLocks noGrp="1"/>
+          </p:cNvSpPr>
+          <p:nvPr>
+            <p:ph type="title"/>
+          </p:nvPr>
+        </p:nvSpPr>
+        <p:spPr/>
+        <p:txBody>
+          <a:bodyPr/>
+          <a:lstStyle/>
+          <a:p>
+            <a:r>
+              <a:rPr lang="en-US" dirty="0"/>
+              <a:t>Generics</a:t>
+            </a:r>
+          </a:p>
+        </p:txBody>
+      </p:sp>
+      <p:sp>
+        <p:nvSpPr>
+          <p:cNvPr id="3" name="Content Placeholder 2"/>
+          <p:cNvSpPr>
+            <a:spLocks noGrp="1"/>
+          </p:cNvSpPr>
+          <p:nvPr>
+            <p:ph idx="1"/>
+          </p:nvPr>
+        </p:nvSpPr>
+        <p:spPr/>
+        <p:txBody>
+          <a:bodyPr/>
+          <a:lstStyle/>
+          <a:p>
+            <a:r>
+              <a:rPr lang="en-US" dirty="0"/>
+              <a:t>Like C# and VB.NET generics</a:t>
+            </a:r>
+          </a:p>
+          <a:p>
+            <a:r>
+              <a:rPr lang="en-US" dirty="0"/>
+              <a:t>Most common generic: Array type</a:t>
+            </a:r>
+          </a:p>
+        </p:txBody>
+      </p:sp>
+      <p:pic>
+        <p:nvPicPr>
+          <p:cNvPr id="4" name="Picture 3"/>
+          <p:cNvPicPr>
+            <a:picLocks noChangeAspect="1"/>
+          </p:cNvPicPr>
+          <p:nvPr/>
+        </p:nvPicPr>
+        <p:blipFill>
+          <a:blip r:embed="rId2"/>
+          <a:stretch>
+            <a:fillRect/>
+          </a:stretch>
+        </p:blipFill>
+        <p:spPr>
+          <a:xfrm>
+            <a:off x="1035191" y="3373073"/>
+            <a:ext cx="5600277" cy="2406257"/>
+          </a:xfrm>
+          <a:prstGeom prst="rect">
+            <a:avLst/>
+          </a:prstGeom>
+        </p:spPr>
+      </p:pic>
+      <p:pic>
+        <p:nvPicPr>
+          <p:cNvPr id="5" name="Picture 4"/>
+          <p:cNvPicPr>
+            <a:picLocks noChangeAspect="1"/>
+          </p:cNvPicPr>
+          <p:nvPr/>
+        </p:nvPicPr>
+        <p:blipFill>
+          <a:blip r:embed="rId3"/>
+          <a:stretch>
+            <a:fillRect/>
+          </a:stretch>
+        </p:blipFill>
+        <p:spPr>
+          <a:xfrm>
+            <a:off x="5155680" y="3042676"/>
+            <a:ext cx="6753225" cy="1533525"/>
+          </a:xfrm>
+          <a:prstGeom prst="rect">
+            <a:avLst/>
+          </a:prstGeom>
+        </p:spPr>
+      </p:pic>
+    </p:spTree>
+    <p:extLst>
+      <p:ext uri="{BB962C8B-B14F-4D97-AF65-F5344CB8AC3E}">
+        <p14:creationId xmlns:p14="http://schemas.microsoft.com/office/powerpoint/2010/main" val="2454627205"/>
+      </p:ext>
+    </p:extLst>
+  </p:cSld>
+  <p:clrMapOvr>
+    <a:masterClrMapping/>
+  </p:clrMapOvr>
+  <p:timing>
+    <p:tnLst>
+      <p:par>
+        <p:cTn id="1" dur="indefinite" restart="never" nodeType="tmRoot">
+          <p:childTnLst>
+            <p:seq concurrent="1" nextAc="seek">
+              <p:cTn id="2" dur="indefinite" nodeType="mainSeq">
+                <p:childTnLst>
+                  <p:par>
+                    <p:cTn id="3" fill="hold">
+                      <p:stCondLst>
+                        <p:cond delay="indefinite"/>
+                      </p:stCondLst>
+                      <p:childTnLst>
+                        <p:par>
+                          <p:cTn id="4" fill="hold">
+                            <p:stCondLst>
+                              <p:cond delay="0"/>
+                            </p:stCondLst>
+                            <p:childTnLst>
+                              <p:par>
+                                <p:cTn id="5" presetID="1" presetClass="entr" presetSubtype="0" fill="hold" grpId="0" nodeType="clickEffect">
+                                  <p:stCondLst>
+                                    <p:cond delay="0"/>
+                                  </p:stCondLst>
+                                  <p:childTnLst>
+                                    <p:set>
+                                      <p:cBhvr>
+                                        <p:cTn id="6" dur="1" fill="hold">
+                                          <p:stCondLst>
+                                            <p:cond delay="0"/>
+                                          </p:stCondLst>
+                                        </p:cTn>
+                                        <p:tgtEl>
+                                          <p:spTgt spid="3">
+                                            <p:txEl>
+                                              <p:pRg st="0" end="0"/>
+                                            </p:txEl>
+                                          </p:spTgt>
+                                        </p:tgtEl>
+                                        <p:attrNameLst>
+                                          <p:attrName>style.visibility</p:attrName>
+                                        </p:attrNameLst>
+                                      </p:cBhvr>
+                                      <p:to>
+                                        <p:strVal val="visible"/>
+                                      </p:to>
+                                    </p:set>
+                                  </p:childTnLst>
+                                </p:cTn>
+                              </p:par>
+                            </p:childTnLst>
+                          </p:cTn>
+                        </p:par>
+                      </p:childTnLst>
+                    </p:cTn>
+                  </p:par>
+                  <p:par>
+                    <p:cTn id="7" fill="hold">
+                      <p:stCondLst>
+                        <p:cond delay="indefinite"/>
+                      </p:stCondLst>
+                      <p:childTnLst>
+                        <p:par>
+                          <p:cTn id="8" fill="hold">
+                            <p:stCondLst>
+                              <p:cond delay="0"/>
+                            </p:stCondLst>
+                            <p:childTnLst>
+                              <p:par>
+                                <p:cTn id="9" presetID="1" presetClass="entr" presetSubtype="0" fill="hold" grpId="0" nodeType="clickEffect">
+                                  <p:stCondLst>
+                                    <p:cond delay="0"/>
+                                  </p:stCondLst>
+                                  <p:childTnLst>
+                                    <p:set>
+                                      <p:cBhvr>
+                                        <p:cTn id="10" dur="1" fill="hold">
+                                          <p:stCondLst>
+                                            <p:cond delay="0"/>
+                                          </p:stCondLst>
+                                        </p:cTn>
+                                        <p:tgtEl>
+                                          <p:spTgt spid="3">
+                                            <p:txEl>
+                                              <p:pRg st="1" end="1"/>
+                                            </p:txEl>
+                                          </p:spTgt>
+                                        </p:tgtEl>
+                                        <p:attrNameLst>
+                                          <p:attrName>style.visibility</p:attrName>
+                                        </p:attrNameLst>
+                                      </p:cBhvr>
+                                      <p:to>
+                                        <p:strVal val="visible"/>
+                                      </p:to>
+                                    </p:set>
+                                  </p:childTnLst>
+                                </p:cTn>
+                              </p:par>
+                            </p:childTnLst>
+                          </p:cTn>
+                        </p:par>
+                      </p:childTnLst>
+                    </p:cTn>
+                  </p:par>
+                  <p:par>
+                    <p:cTn id="11" fill="hold">
+                      <p:stCondLst>
+                        <p:cond delay="indefinite"/>
+                      </p:stCondLst>
+                      <p:childTnLst>
+                        <p:par>
+                          <p:cTn id="12" fill="hold">
+                            <p:stCondLst>
+                              <p:cond delay="0"/>
+                            </p:stCondLst>
+                            <p:childTnLst>
+                              <p:par>
+                                <p:cTn id="13" presetID="1" presetClass="entr" presetSubtype="0" fill="hold" nodeType="clickEffect">
+                                  <p:stCondLst>
+                                    <p:cond delay="0"/>
+                                  </p:stCondLst>
+                                  <p:childTnLst>
+                                    <p:set>
+                                      <p:cBhvr>
+                                        <p:cTn id="14" dur="1" fill="hold">
+                                          <p:stCondLst>
+                                            <p:cond delay="0"/>
+                                          </p:stCondLst>
+                                        </p:cTn>
+                                        <p:tgtEl>
+                                          <p:spTgt spid="4"/>
+                                        </p:tgtEl>
+                                        <p:attrNameLst>
+                                          <p:attrName>style.visibility</p:attrName>
+                                        </p:attrNameLst>
+                                      </p:cBhvr>
+                                      <p:to>
+                                        <p:strVal val="visible"/>
+                                      </p:to>
+                                    </p:set>
+                                  </p:childTnLst>
+                                </p:cTn>
+                              </p:par>
+                            </p:childTnLst>
+                          </p:cTn>
+                        </p:par>
+                      </p:childTnLst>
+                    </p:cTn>
+                  </p:par>
+                  <p:par>
+                    <p:cTn id="15" fill="hold">
+                      <p:stCondLst>
+                        <p:cond delay="indefinite"/>
+                      </p:stCondLst>
+                      <p:childTnLst>
+                        <p:par>
+                          <p:cTn id="16" fill="hold">
+                            <p:stCondLst>
+                              <p:cond delay="0"/>
+                            </p:stCondLst>
+                            <p:childTnLst>
+                              <p:par>
+                                <p:cTn id="17" presetID="1" presetClass="entr" presetSubtype="0" fill="hold" nodeType="clickEffect">
+                                  <p:stCondLst>
+                                    <p:cond delay="0"/>
+                                  </p:stCondLst>
+                                  <p:childTnLst>
+                                    <p:set>
+                                      <p:cBhvr>
+                                        <p:cTn id="18" dur="1" fill="hold">
+                                          <p:stCondLst>
+                                            <p:cond delay="0"/>
+                                          </p:stCondLst>
+                                        </p:cTn>
+                                        <p:tgtEl>
+                                          <p:spTgt spid="5"/>
+                                        </p:tgtEl>
+                                        <p:attrNameLst>
+                                          <p:attrName>style.visibility</p:attrName>
+                                        </p:attrNameLst>
+                                      </p:cBhvr>
+                                      <p:to>
+                                        <p:strVal val="visible"/>
+                                      </p:to>
+                                    </p:set>
+                                  </p:childTnLst>
+                                </p:cTn>
+                              </p:par>
+                            </p:childTnLst>
+                          </p:cTn>
+                        </p:par>
+                      </p:childTnLst>
+                    </p:cTn>
+                  </p:par>
+                </p:childTnLst>
+              </p:cTn>
+              <p:prevCondLst>
+                <p:cond evt="onPrev" delay="0">
+                  <p:tgtEl>
+                    <p:sldTgt/>
+                  </p:tgtEl>
+                </p:cond>
+              </p:prevCondLst>
+              <p:nextCondLst>
+                <p:cond evt="onNext" delay="0">
+                  <p:tgtEl>
+                    <p:sldTgt/>
+                  </p:tgtEl>
+                </p:cond>
+              </p:nextCondLst>
+            </p:seq>
+          </p:childTnLst>
+        </p:cTn>
+      </p:par>
+    </p:tnLst>
+    <p:bldLst>
+      <p:bldP spid="3" grpId="0" build="p"/>
+    </p:bldLst>
+  </p:timing>
+</p:sld>
+</file>
+
+<file path=ppt/slides/slide16.xml><?xml version="1.0" encoding="utf-8"?>
+<p:sld xmlns:a="http://schemas.openxmlformats.org/drawingml/2006/main" xmlns:r="http://schemas.openxmlformats.org/officeDocument/2006/relationships" xmlns:p="http://schemas.openxmlformats.org/presentationml/2006/main">
+  <p:cSld>
+    <p:spTree>
+      <p:nvGrpSpPr>
+        <p:cNvPr id="1" name=""/>
+        <p:cNvGrpSpPr/>
+        <p:nvPr/>
+      </p:nvGrpSpPr>
+      <p:grpSpPr>
+        <a:xfrm>
+          <a:off x="0" y="0"/>
+          <a:ext cx="0" cy="0"/>
+          <a:chOff x="0" y="0"/>
+          <a:chExt cx="0" cy="0"/>
+        </a:xfrm>
+      </p:grpSpPr>
+      <p:sp>
+        <p:nvSpPr>
+          <p:cNvPr id="2" name="Title 1"/>
+          <p:cNvSpPr>
+            <a:spLocks noGrp="1"/>
+          </p:cNvSpPr>
+          <p:nvPr>
+            <p:ph type="title"/>
+          </p:nvPr>
+        </p:nvSpPr>
+        <p:spPr/>
+        <p:txBody>
+          <a:bodyPr/>
+          <a:lstStyle/>
+          <a:p>
+            <a:r>
+              <a:rPr lang="en-US" dirty="0">
+                <a:latin typeface="Consolas" panose="020B0609020204030204" pitchFamily="49" charset="0"/>
+              </a:rPr>
+              <a:t>this</a:t>
+            </a:r>
+          </a:p>
+        </p:txBody>
+      </p:sp>
+      <p:sp>
+        <p:nvSpPr>
+          <p:cNvPr id="3" name="Content Placeholder 2"/>
+          <p:cNvSpPr>
+            <a:spLocks noGrp="1"/>
+          </p:cNvSpPr>
+          <p:nvPr>
+            <p:ph idx="1"/>
+          </p:nvPr>
+        </p:nvSpPr>
+        <p:spPr>
+          <a:xfrm>
+            <a:off x="838200" y="1506682"/>
+            <a:ext cx="10515600" cy="4670281"/>
+          </a:xfrm>
+        </p:spPr>
+        <p:txBody>
+          <a:bodyPr/>
+          <a:lstStyle/>
+          <a:p>
+            <a:r>
+              <a:rPr lang="en-US" dirty="0"/>
+              <a:t>Lots of power, lots of heartache, as </a:t>
+            </a:r>
+            <a:r>
+              <a:rPr lang="en-US" dirty="0">
+                <a:solidFill>
+                  <a:srgbClr val="FF0000"/>
+                </a:solidFill>
+                <a:latin typeface="Consolas" panose="020B0609020204030204" pitchFamily="49" charset="0"/>
+              </a:rPr>
+              <a:t>this</a:t>
+            </a:r>
+            <a:r>
+              <a:rPr lang="en-US" dirty="0"/>
+              <a:t> can be changed function by function </a:t>
+            </a:r>
+          </a:p>
+          <a:p>
+            <a:r>
+              <a:rPr lang="en-US" dirty="0"/>
+              <a:t>Our main use for it: know that you need to use this to access variables in class scope</a:t>
+            </a:r>
+          </a:p>
+        </p:txBody>
+      </p:sp>
+      <p:pic>
+        <p:nvPicPr>
+          <p:cNvPr id="5" name="Picture 4"/>
+          <p:cNvPicPr>
+            <a:picLocks noChangeAspect="1"/>
+          </p:cNvPicPr>
+          <p:nvPr/>
+        </p:nvPicPr>
+        <p:blipFill>
+          <a:blip r:embed="rId2"/>
+          <a:stretch>
+            <a:fillRect/>
+          </a:stretch>
+        </p:blipFill>
+        <p:spPr>
+          <a:xfrm>
+            <a:off x="1141617" y="3453876"/>
+            <a:ext cx="9908765" cy="2992029"/>
+          </a:xfrm>
+          <a:prstGeom prst="rect">
+            <a:avLst/>
+          </a:prstGeom>
+        </p:spPr>
+      </p:pic>
+    </p:spTree>
+    <p:extLst>
+      <p:ext uri="{BB962C8B-B14F-4D97-AF65-F5344CB8AC3E}">
+        <p14:creationId xmlns:p14="http://schemas.microsoft.com/office/powerpoint/2010/main" val="2632806276"/>
+      </p:ext>
+    </p:extLst>
+  </p:cSld>
+  <p:clrMapOvr>
+    <a:masterClrMapping/>
+  </p:clrMapOvr>
+</p:sld>
+</file>
+
+<file path=ppt/slides/slide17.xml><?xml version="1.0" encoding="utf-8"?>
+<p:sld xmlns:a="http://schemas.openxmlformats.org/drawingml/2006/main" xmlns:r="http://schemas.openxmlformats.org/officeDocument/2006/relationships" xmlns:p="http://schemas.openxmlformats.org/presentationml/2006/main">
+  <p:cSld>
+    <p:spTree>
+      <p:nvGrpSpPr>
+        <p:cNvPr id="1" name=""/>
+        <p:cNvGrpSpPr/>
+        <p:nvPr/>
+      </p:nvGrpSpPr>
+      <p:grpSpPr>
+        <a:xfrm>
+          <a:off x="0" y="0"/>
+          <a:ext cx="0" cy="0"/>
+          <a:chOff x="0" y="0"/>
+          <a:chExt cx="0" cy="0"/>
+        </a:xfrm>
+      </p:grpSpPr>
+      <p:sp>
+        <p:nvSpPr>
+          <p:cNvPr id="2" name="Title 1"/>
+          <p:cNvSpPr>
+            <a:spLocks noGrp="1"/>
+          </p:cNvSpPr>
+          <p:nvPr>
+            <p:ph type="title"/>
+          </p:nvPr>
+        </p:nvSpPr>
+        <p:spPr/>
+        <p:txBody>
+          <a:bodyPr/>
+          <a:lstStyle/>
+          <a:p>
+            <a:r>
+              <a:rPr lang="en-US" dirty="0"/>
+              <a:t>Decorators</a:t>
+            </a:r>
+          </a:p>
+        </p:txBody>
+      </p:sp>
+      <p:sp>
+        <p:nvSpPr>
+          <p:cNvPr id="3" name="Content Placeholder 2"/>
+          <p:cNvSpPr>
+            <a:spLocks noGrp="1"/>
+          </p:cNvSpPr>
+          <p:nvPr>
+            <p:ph idx="1"/>
+          </p:nvPr>
+        </p:nvSpPr>
+        <p:spPr>
+          <a:xfrm>
+            <a:off x="838200" y="1690688"/>
+            <a:ext cx="10515600" cy="4486275"/>
+          </a:xfrm>
+        </p:spPr>
+        <p:txBody>
+          <a:bodyPr/>
+          <a:lstStyle/>
+          <a:p>
+            <a:r>
+              <a:rPr lang="en-US" dirty="0"/>
+              <a:t>Basically, attributes in C#/VB.NET</a:t>
+            </a:r>
+          </a:p>
+          <a:p>
+            <a:r>
+              <a:rPr lang="en-US" dirty="0"/>
+              <a:t>Considered experimental feature – can only be turned on with compiler option</a:t>
+            </a:r>
+          </a:p>
+          <a:p>
+            <a:endParaRPr lang="en-US" dirty="0"/>
+          </a:p>
+        </p:txBody>
+      </p:sp>
+      <p:pic>
+        <p:nvPicPr>
+          <p:cNvPr id="4" name="Picture 3"/>
+          <p:cNvPicPr>
+            <a:picLocks noChangeAspect="1"/>
+          </p:cNvPicPr>
+          <p:nvPr/>
+        </p:nvPicPr>
+        <p:blipFill>
+          <a:blip r:embed="rId2"/>
+          <a:stretch>
+            <a:fillRect/>
+          </a:stretch>
+        </p:blipFill>
+        <p:spPr>
+          <a:xfrm>
+            <a:off x="1046013" y="3581063"/>
+            <a:ext cx="7991475" cy="2266950"/>
+          </a:xfrm>
+          <a:prstGeom prst="rect">
+            <a:avLst/>
+          </a:prstGeom>
+        </p:spPr>
+      </p:pic>
+    </p:spTree>
+    <p:extLst>
+      <p:ext uri="{BB962C8B-B14F-4D97-AF65-F5344CB8AC3E}">
+        <p14:creationId xmlns:p14="http://schemas.microsoft.com/office/powerpoint/2010/main" val="212514162"/>
+      </p:ext>
+    </p:extLst>
+  </p:cSld>
+  <p:clrMapOvr>
+    <a:masterClrMapping/>
+  </p:clrMapOvr>
+</p:sld>
+</file>
+
+<file path=ppt/slides/slide18.xml><?xml version="1.0" encoding="utf-8"?>
+<p:sld xmlns:a="http://schemas.openxmlformats.org/drawingml/2006/main" xmlns:r="http://schemas.openxmlformats.org/officeDocument/2006/relationships" xmlns:p="http://schemas.openxmlformats.org/presentationml/2006/main">
+  <p:cSld>
+    <p:spTree>
+      <p:nvGrpSpPr>
+        <p:cNvPr id="1" name=""/>
+        <p:cNvGrpSpPr/>
+        <p:nvPr/>
+      </p:nvGrpSpPr>
+      <p:grpSpPr>
+        <a:xfrm>
+          <a:off x="0" y="0"/>
+          <a:ext cx="0" cy="0"/>
+          <a:chOff x="0" y="0"/>
+          <a:chExt cx="0" cy="0"/>
+        </a:xfrm>
+      </p:grpSpPr>
+      <p:sp>
+        <p:nvSpPr>
+          <p:cNvPr id="2" name="Title 1"/>
+          <p:cNvSpPr>
+            <a:spLocks noGrp="1"/>
+          </p:cNvSpPr>
+          <p:nvPr>
+            <p:ph type="title"/>
+          </p:nvPr>
+        </p:nvSpPr>
+        <p:spPr/>
+        <p:txBody>
+          <a:bodyPr/>
+          <a:lstStyle/>
+          <a:p>
+            <a:r>
+              <a:rPr lang="en-US" dirty="0">
+                <a:latin typeface="Consolas" panose="020B0609020204030204" pitchFamily="49" charset="0"/>
+              </a:rPr>
+              <a:t>import/export</a:t>
+            </a:r>
+          </a:p>
+        </p:txBody>
+      </p:sp>
+      <p:sp>
+        <p:nvSpPr>
+          <p:cNvPr id="3" name="Content Placeholder 2"/>
+          <p:cNvSpPr>
+            <a:spLocks noGrp="1"/>
+          </p:cNvSpPr>
+          <p:nvPr>
+            <p:ph idx="1"/>
+          </p:nvPr>
+        </p:nvSpPr>
+        <p:spPr/>
+        <p:txBody>
+          <a:bodyPr/>
+          <a:lstStyle/>
+          <a:p>
+            <a:r>
+              <a:rPr lang="en-US" dirty="0"/>
+              <a:t>Like </a:t>
+            </a:r>
+            <a:r>
+              <a:rPr lang="en-US" dirty="0">
+                <a:latin typeface="Consolas" panose="020B0609020204030204" pitchFamily="49" charset="0"/>
+              </a:rPr>
+              <a:t>using</a:t>
+            </a:r>
+            <a:r>
+              <a:rPr lang="en-US" dirty="0"/>
+              <a:t> statements in C#/VB.NET</a:t>
+            </a:r>
+          </a:p>
+          <a:p>
+            <a:r>
+              <a:rPr lang="en-US" dirty="0">
+                <a:latin typeface="Consolas" panose="020B0609020204030204" pitchFamily="49" charset="0"/>
+              </a:rPr>
+              <a:t>import</a:t>
+            </a:r>
+            <a:r>
+              <a:rPr lang="en-US" dirty="0"/>
+              <a:t> statements allow us to get code from other </a:t>
+            </a:r>
+            <a:r>
+              <a:rPr lang="en-US" dirty="0" err="1"/>
+              <a:t>TypeScript</a:t>
+            </a:r>
+            <a:r>
+              <a:rPr lang="en-US" dirty="0"/>
+              <a:t> declarations</a:t>
+            </a:r>
+          </a:p>
+          <a:p>
+            <a:r>
+              <a:rPr lang="en-US" dirty="0">
+                <a:latin typeface="Consolas" panose="020B0609020204030204" pitchFamily="49" charset="0"/>
+              </a:rPr>
+              <a:t>export</a:t>
+            </a:r>
+            <a:r>
+              <a:rPr lang="en-US" dirty="0"/>
+              <a:t> simply means public</a:t>
+            </a:r>
+          </a:p>
+          <a:p>
+            <a:endParaRPr lang="en-US" dirty="0"/>
+          </a:p>
+        </p:txBody>
+      </p:sp>
+      <p:pic>
+        <p:nvPicPr>
+          <p:cNvPr id="7" name="Picture 6"/>
+          <p:cNvPicPr>
+            <a:picLocks noChangeAspect="1"/>
+          </p:cNvPicPr>
+          <p:nvPr/>
+        </p:nvPicPr>
+        <p:blipFill>
+          <a:blip r:embed="rId2"/>
+          <a:stretch>
+            <a:fillRect/>
+          </a:stretch>
+        </p:blipFill>
+        <p:spPr>
+          <a:xfrm>
+            <a:off x="838200" y="4170897"/>
+            <a:ext cx="4942947" cy="2006066"/>
+          </a:xfrm>
+          <a:prstGeom prst="rect">
+            <a:avLst/>
+          </a:prstGeom>
+        </p:spPr>
+      </p:pic>
+      <p:pic>
+        <p:nvPicPr>
+          <p:cNvPr id="8" name="Picture 7"/>
+          <p:cNvPicPr>
+            <a:picLocks noChangeAspect="1"/>
+          </p:cNvPicPr>
+          <p:nvPr/>
+        </p:nvPicPr>
+        <p:blipFill>
+          <a:blip r:embed="rId3"/>
+          <a:stretch>
+            <a:fillRect/>
+          </a:stretch>
+        </p:blipFill>
+        <p:spPr>
+          <a:xfrm>
+            <a:off x="6900862" y="4170897"/>
+            <a:ext cx="4452938" cy="2134466"/>
+          </a:xfrm>
+          <a:prstGeom prst="rect">
+            <a:avLst/>
+          </a:prstGeom>
+        </p:spPr>
+      </p:pic>
+    </p:spTree>
+    <p:extLst>
+      <p:ext uri="{BB962C8B-B14F-4D97-AF65-F5344CB8AC3E}">
+        <p14:creationId xmlns:p14="http://schemas.microsoft.com/office/powerpoint/2010/main" val="274879912"/>
       </p:ext>
     </p:extLst>
   </p:cSld>
@@ -3159,6 +5257,377 @@
   <p:clrMapOvr>
     <a:masterClrMapping/>
   </p:clrMapOvr>
+  <p:timing>
+    <p:tnLst>
+      <p:par>
+        <p:cTn id="1" dur="indefinite" restart="never" nodeType="tmRoot">
+          <p:childTnLst>
+            <p:seq concurrent="1" nextAc="seek">
+              <p:cTn id="2" dur="indefinite" nodeType="mainSeq">
+                <p:childTnLst>
+                  <p:par>
+                    <p:cTn id="3" fill="hold">
+                      <p:stCondLst>
+                        <p:cond delay="indefinite"/>
+                      </p:stCondLst>
+                      <p:childTnLst>
+                        <p:par>
+                          <p:cTn id="4" fill="hold">
+                            <p:stCondLst>
+                              <p:cond delay="0"/>
+                            </p:stCondLst>
+                            <p:childTnLst>
+                              <p:par>
+                                <p:cTn id="5" presetID="1" presetClass="entr" presetSubtype="0" fill="hold" grpId="0" nodeType="clickEffect">
+                                  <p:stCondLst>
+                                    <p:cond delay="0"/>
+                                  </p:stCondLst>
+                                  <p:childTnLst>
+                                    <p:set>
+                                      <p:cBhvr>
+                                        <p:cTn id="6" dur="1" fill="hold">
+                                          <p:stCondLst>
+                                            <p:cond delay="0"/>
+                                          </p:stCondLst>
+                                        </p:cTn>
+                                        <p:tgtEl>
+                                          <p:spTgt spid="3">
+                                            <p:txEl>
+                                              <p:pRg st="0" end="0"/>
+                                            </p:txEl>
+                                          </p:spTgt>
+                                        </p:tgtEl>
+                                        <p:attrNameLst>
+                                          <p:attrName>style.visibility</p:attrName>
+                                        </p:attrNameLst>
+                                      </p:cBhvr>
+                                      <p:to>
+                                        <p:strVal val="visible"/>
+                                      </p:to>
+                                    </p:set>
+                                  </p:childTnLst>
+                                </p:cTn>
+                              </p:par>
+                            </p:childTnLst>
+                          </p:cTn>
+                        </p:par>
+                      </p:childTnLst>
+                    </p:cTn>
+                  </p:par>
+                  <p:par>
+                    <p:cTn id="7" fill="hold">
+                      <p:stCondLst>
+                        <p:cond delay="indefinite"/>
+                      </p:stCondLst>
+                      <p:childTnLst>
+                        <p:par>
+                          <p:cTn id="8" fill="hold">
+                            <p:stCondLst>
+                              <p:cond delay="0"/>
+                            </p:stCondLst>
+                            <p:childTnLst>
+                              <p:par>
+                                <p:cTn id="9" presetID="1" presetClass="entr" presetSubtype="0" fill="hold" grpId="0" nodeType="clickEffect">
+                                  <p:stCondLst>
+                                    <p:cond delay="0"/>
+                                  </p:stCondLst>
+                                  <p:childTnLst>
+                                    <p:set>
+                                      <p:cBhvr>
+                                        <p:cTn id="10" dur="1" fill="hold">
+                                          <p:stCondLst>
+                                            <p:cond delay="0"/>
+                                          </p:stCondLst>
+                                        </p:cTn>
+                                        <p:tgtEl>
+                                          <p:spTgt spid="3">
+                                            <p:txEl>
+                                              <p:pRg st="1" end="1"/>
+                                            </p:txEl>
+                                          </p:spTgt>
+                                        </p:tgtEl>
+                                        <p:attrNameLst>
+                                          <p:attrName>style.visibility</p:attrName>
+                                        </p:attrNameLst>
+                                      </p:cBhvr>
+                                      <p:to>
+                                        <p:strVal val="visible"/>
+                                      </p:to>
+                                    </p:set>
+                                  </p:childTnLst>
+                                </p:cTn>
+                              </p:par>
+                            </p:childTnLst>
+                          </p:cTn>
+                        </p:par>
+                      </p:childTnLst>
+                    </p:cTn>
+                  </p:par>
+                  <p:par>
+                    <p:cTn id="11" fill="hold">
+                      <p:stCondLst>
+                        <p:cond delay="indefinite"/>
+                      </p:stCondLst>
+                      <p:childTnLst>
+                        <p:par>
+                          <p:cTn id="12" fill="hold">
+                            <p:stCondLst>
+                              <p:cond delay="0"/>
+                            </p:stCondLst>
+                            <p:childTnLst>
+                              <p:par>
+                                <p:cTn id="13" presetID="1" presetClass="entr" presetSubtype="0" fill="hold" grpId="0" nodeType="clickEffect">
+                                  <p:stCondLst>
+                                    <p:cond delay="0"/>
+                                  </p:stCondLst>
+                                  <p:childTnLst>
+                                    <p:set>
+                                      <p:cBhvr>
+                                        <p:cTn id="14" dur="1" fill="hold">
+                                          <p:stCondLst>
+                                            <p:cond delay="0"/>
+                                          </p:stCondLst>
+                                        </p:cTn>
+                                        <p:tgtEl>
+                                          <p:spTgt spid="3">
+                                            <p:txEl>
+                                              <p:pRg st="2" end="2"/>
+                                            </p:txEl>
+                                          </p:spTgt>
+                                        </p:tgtEl>
+                                        <p:attrNameLst>
+                                          <p:attrName>style.visibility</p:attrName>
+                                        </p:attrNameLst>
+                                      </p:cBhvr>
+                                      <p:to>
+                                        <p:strVal val="visible"/>
+                                      </p:to>
+                                    </p:set>
+                                  </p:childTnLst>
+                                </p:cTn>
+                              </p:par>
+                            </p:childTnLst>
+                          </p:cTn>
+                        </p:par>
+                      </p:childTnLst>
+                    </p:cTn>
+                  </p:par>
+                  <p:par>
+                    <p:cTn id="15" fill="hold">
+                      <p:stCondLst>
+                        <p:cond delay="indefinite"/>
+                      </p:stCondLst>
+                      <p:childTnLst>
+                        <p:par>
+                          <p:cTn id="16" fill="hold">
+                            <p:stCondLst>
+                              <p:cond delay="0"/>
+                            </p:stCondLst>
+                            <p:childTnLst>
+                              <p:par>
+                                <p:cTn id="17" presetID="1" presetClass="entr" presetSubtype="0" fill="hold" grpId="0" nodeType="clickEffect">
+                                  <p:stCondLst>
+                                    <p:cond delay="0"/>
+                                  </p:stCondLst>
+                                  <p:childTnLst>
+                                    <p:set>
+                                      <p:cBhvr>
+                                        <p:cTn id="18" dur="1" fill="hold">
+                                          <p:stCondLst>
+                                            <p:cond delay="0"/>
+                                          </p:stCondLst>
+                                        </p:cTn>
+                                        <p:tgtEl>
+                                          <p:spTgt spid="3">
+                                            <p:txEl>
+                                              <p:pRg st="3" end="3"/>
+                                            </p:txEl>
+                                          </p:spTgt>
+                                        </p:tgtEl>
+                                        <p:attrNameLst>
+                                          <p:attrName>style.visibility</p:attrName>
+                                        </p:attrNameLst>
+                                      </p:cBhvr>
+                                      <p:to>
+                                        <p:strVal val="visible"/>
+                                      </p:to>
+                                    </p:set>
+                                  </p:childTnLst>
+                                </p:cTn>
+                              </p:par>
+                            </p:childTnLst>
+                          </p:cTn>
+                        </p:par>
+                      </p:childTnLst>
+                    </p:cTn>
+                  </p:par>
+                  <p:par>
+                    <p:cTn id="19" fill="hold">
+                      <p:stCondLst>
+                        <p:cond delay="indefinite"/>
+                      </p:stCondLst>
+                      <p:childTnLst>
+                        <p:par>
+                          <p:cTn id="20" fill="hold">
+                            <p:stCondLst>
+                              <p:cond delay="0"/>
+                            </p:stCondLst>
+                            <p:childTnLst>
+                              <p:par>
+                                <p:cTn id="21" presetID="1" presetClass="entr" presetSubtype="0" fill="hold" grpId="0" nodeType="clickEffect">
+                                  <p:stCondLst>
+                                    <p:cond delay="0"/>
+                                  </p:stCondLst>
+                                  <p:childTnLst>
+                                    <p:set>
+                                      <p:cBhvr>
+                                        <p:cTn id="22" dur="1" fill="hold">
+                                          <p:stCondLst>
+                                            <p:cond delay="0"/>
+                                          </p:stCondLst>
+                                        </p:cTn>
+                                        <p:tgtEl>
+                                          <p:spTgt spid="3">
+                                            <p:txEl>
+                                              <p:pRg st="4" end="4"/>
+                                            </p:txEl>
+                                          </p:spTgt>
+                                        </p:tgtEl>
+                                        <p:attrNameLst>
+                                          <p:attrName>style.visibility</p:attrName>
+                                        </p:attrNameLst>
+                                      </p:cBhvr>
+                                      <p:to>
+                                        <p:strVal val="visible"/>
+                                      </p:to>
+                                    </p:set>
+                                  </p:childTnLst>
+                                </p:cTn>
+                              </p:par>
+                              <p:par>
+                                <p:cTn id="23" presetID="1" presetClass="entr" presetSubtype="0" fill="hold" grpId="0" nodeType="withEffect">
+                                  <p:stCondLst>
+                                    <p:cond delay="0"/>
+                                  </p:stCondLst>
+                                  <p:childTnLst>
+                                    <p:set>
+                                      <p:cBhvr>
+                                        <p:cTn id="24" dur="1" fill="hold">
+                                          <p:stCondLst>
+                                            <p:cond delay="0"/>
+                                          </p:stCondLst>
+                                        </p:cTn>
+                                        <p:tgtEl>
+                                          <p:spTgt spid="3">
+                                            <p:txEl>
+                                              <p:pRg st="5" end="5"/>
+                                            </p:txEl>
+                                          </p:spTgt>
+                                        </p:tgtEl>
+                                        <p:attrNameLst>
+                                          <p:attrName>style.visibility</p:attrName>
+                                        </p:attrNameLst>
+                                      </p:cBhvr>
+                                      <p:to>
+                                        <p:strVal val="visible"/>
+                                      </p:to>
+                                    </p:set>
+                                  </p:childTnLst>
+                                </p:cTn>
+                              </p:par>
+                              <p:par>
+                                <p:cTn id="25" presetID="1" presetClass="entr" presetSubtype="0" fill="hold" grpId="0" nodeType="withEffect">
+                                  <p:stCondLst>
+                                    <p:cond delay="0"/>
+                                  </p:stCondLst>
+                                  <p:childTnLst>
+                                    <p:set>
+                                      <p:cBhvr>
+                                        <p:cTn id="26" dur="1" fill="hold">
+                                          <p:stCondLst>
+                                            <p:cond delay="0"/>
+                                          </p:stCondLst>
+                                        </p:cTn>
+                                        <p:tgtEl>
+                                          <p:spTgt spid="3">
+                                            <p:txEl>
+                                              <p:pRg st="6" end="6"/>
+                                            </p:txEl>
+                                          </p:spTgt>
+                                        </p:tgtEl>
+                                        <p:attrNameLst>
+                                          <p:attrName>style.visibility</p:attrName>
+                                        </p:attrNameLst>
+                                      </p:cBhvr>
+                                      <p:to>
+                                        <p:strVal val="visible"/>
+                                      </p:to>
+                                    </p:set>
+                                  </p:childTnLst>
+                                </p:cTn>
+                              </p:par>
+                              <p:par>
+                                <p:cTn id="27" presetID="1" presetClass="entr" presetSubtype="0" fill="hold" grpId="0" nodeType="withEffect">
+                                  <p:stCondLst>
+                                    <p:cond delay="0"/>
+                                  </p:stCondLst>
+                                  <p:childTnLst>
+                                    <p:set>
+                                      <p:cBhvr>
+                                        <p:cTn id="28" dur="1" fill="hold">
+                                          <p:stCondLst>
+                                            <p:cond delay="0"/>
+                                          </p:stCondLst>
+                                        </p:cTn>
+                                        <p:tgtEl>
+                                          <p:spTgt spid="3">
+                                            <p:txEl>
+                                              <p:pRg st="7" end="7"/>
+                                            </p:txEl>
+                                          </p:spTgt>
+                                        </p:tgtEl>
+                                        <p:attrNameLst>
+                                          <p:attrName>style.visibility</p:attrName>
+                                        </p:attrNameLst>
+                                      </p:cBhvr>
+                                      <p:to>
+                                        <p:strVal val="visible"/>
+                                      </p:to>
+                                    </p:set>
+                                  </p:childTnLst>
+                                </p:cTn>
+                              </p:par>
+                            </p:childTnLst>
+                          </p:cTn>
+                        </p:par>
+                      </p:childTnLst>
+                    </p:cTn>
+                  </p:par>
+                </p:childTnLst>
+              </p:cTn>
+              <p:prevCondLst>
+                <p:cond evt="onPrev" delay="0">
+                  <p:tgtEl>
+                    <p:sldTgt/>
+                  </p:tgtEl>
+                </p:cond>
+              </p:prevCondLst>
+              <p:nextCondLst>
+                <p:cond evt="onNext" delay="0">
+                  <p:tgtEl>
+                    <p:sldTgt/>
+                  </p:tgtEl>
+                </p:cond>
+              </p:nextCondLst>
+            </p:seq>
+          </p:childTnLst>
+        </p:cTn>
+      </p:par>
+    </p:tnLst>
+    <p:bldLst>
+      <p:bldP spid="3" grpId="0" uiExpand="1" build="p"/>
+    </p:bldLst>
+  </p:timing>
 </p:sld>
 </file>
 
@@ -3194,8 +5663,110 @@
           <a:bodyPr/>
           <a:lstStyle/>
           <a:p>
+            <a:r>
+              <a:rPr lang="en-US" dirty="0"/>
+              <a:t>Types</a:t>
+            </a:r>
+          </a:p>
+        </p:txBody>
+      </p:sp>
+      <p:sp>
+        <p:nvSpPr>
+          <p:cNvPr id="3" name="Content Placeholder 2"/>
+          <p:cNvSpPr>
+            <a:spLocks noGrp="1"/>
+          </p:cNvSpPr>
+          <p:nvPr>
+            <p:ph idx="1"/>
+          </p:nvPr>
+        </p:nvSpPr>
+        <p:spPr/>
+        <p:txBody>
+          <a:bodyPr/>
+          <a:lstStyle/>
+          <a:p>
+            <a:r>
+              <a:rPr lang="en-US" dirty="0"/>
+              <a:t>Everything derives from object!</a:t>
+            </a:r>
+          </a:p>
+          <a:p>
+            <a:r>
+              <a:rPr lang="en-US" dirty="0"/>
+              <a:t>number</a:t>
+            </a:r>
+          </a:p>
+          <a:p>
+            <a:r>
+              <a:rPr lang="en-US" dirty="0"/>
+              <a:t>string</a:t>
+            </a:r>
+          </a:p>
+          <a:p>
+            <a:r>
+              <a:rPr lang="en-US" dirty="0" err="1"/>
+              <a:t>boolean</a:t>
+            </a:r>
             <a:endParaRPr lang="en-US" dirty="0"/>
           </a:p>
+          <a:p>
+            <a:r>
+              <a:rPr lang="en-US" dirty="0"/>
+              <a:t>Array</a:t>
+            </a:r>
+          </a:p>
+        </p:txBody>
+      </p:sp>
+    </p:spTree>
+    <p:extLst>
+      <p:ext uri="{BB962C8B-B14F-4D97-AF65-F5344CB8AC3E}">
+        <p14:creationId xmlns:p14="http://schemas.microsoft.com/office/powerpoint/2010/main" val="1568030272"/>
+      </p:ext>
+    </p:extLst>
+  </p:cSld>
+  <p:clrMapOvr>
+    <a:masterClrMapping/>
+  </p:clrMapOvr>
+</p:sld>
+</file>
+
+<file path=ppt/slides/slide4.xml><?xml version="1.0" encoding="utf-8"?>
+<p:sld xmlns:a="http://schemas.openxmlformats.org/drawingml/2006/main" xmlns:r="http://schemas.openxmlformats.org/officeDocument/2006/relationships" xmlns:p="http://schemas.openxmlformats.org/presentationml/2006/main">
+  <p:cSld>
+    <p:spTree>
+      <p:nvGrpSpPr>
+        <p:cNvPr id="1" name=""/>
+        <p:cNvGrpSpPr/>
+        <p:nvPr/>
+      </p:nvGrpSpPr>
+      <p:grpSpPr>
+        <a:xfrm>
+          <a:off x="0" y="0"/>
+          <a:ext cx="0" cy="0"/>
+          <a:chOff x="0" y="0"/>
+          <a:chExt cx="0" cy="0"/>
+        </a:xfrm>
+      </p:grpSpPr>
+      <p:sp>
+        <p:nvSpPr>
+          <p:cNvPr id="2" name="Title 1"/>
+          <p:cNvSpPr>
+            <a:spLocks noGrp="1"/>
+          </p:cNvSpPr>
+          <p:nvPr>
+            <p:ph type="title"/>
+          </p:nvPr>
+        </p:nvSpPr>
+        <p:spPr/>
+        <p:txBody>
+          <a:bodyPr/>
+          <a:lstStyle/>
+          <a:p>
+            <a:r>
+              <a:rPr lang="en-US" dirty="0"/>
+              <a:t>Types, cont’d</a:t>
+            </a:r>
+          </a:p>
         </p:txBody>
       </p:sp>
       <p:sp>
@@ -3213,10 +5784,632 @@
           <a:bodyPr/>
           <a:lstStyle/>
           <a:p>
+            <a:r>
+              <a:rPr lang="en-US" dirty="0"/>
+              <a:t>“any” type</a:t>
+            </a:r>
+          </a:p>
+          <a:p>
+            <a:r>
+              <a:rPr lang="en-US" dirty="0"/>
+              <a:t>Means anything goes </a:t>
+            </a:r>
+          </a:p>
+        </p:txBody>
+      </p:sp>
+      <p:pic>
+        <p:nvPicPr>
+          <p:cNvPr id="4" name="Picture 3"/>
+          <p:cNvPicPr>
+            <a:picLocks noChangeAspect="1"/>
+          </p:cNvPicPr>
+          <p:nvPr/>
+        </p:nvPicPr>
+        <p:blipFill>
+          <a:blip r:embed="rId2"/>
+          <a:stretch>
+            <a:fillRect/>
+          </a:stretch>
+        </p:blipFill>
+        <p:spPr>
+          <a:xfrm>
+            <a:off x="1015254" y="3252788"/>
+            <a:ext cx="6791325" cy="2924175"/>
+          </a:xfrm>
+          <a:prstGeom prst="rect">
+            <a:avLst/>
+          </a:prstGeom>
+        </p:spPr>
+      </p:pic>
+    </p:spTree>
+    <p:extLst>
+      <p:ext uri="{BB962C8B-B14F-4D97-AF65-F5344CB8AC3E}">
+        <p14:creationId xmlns:p14="http://schemas.microsoft.com/office/powerpoint/2010/main" val="167243052"/>
+      </p:ext>
+    </p:extLst>
+  </p:cSld>
+  <p:clrMapOvr>
+    <a:masterClrMapping/>
+  </p:clrMapOvr>
+</p:sld>
+</file>
+
+<file path=ppt/slides/slide5.xml><?xml version="1.0" encoding="utf-8"?>
+<p:sld xmlns:a="http://schemas.openxmlformats.org/drawingml/2006/main" xmlns:r="http://schemas.openxmlformats.org/officeDocument/2006/relationships" xmlns:p="http://schemas.openxmlformats.org/presentationml/2006/main">
+  <p:cSld>
+    <p:spTree>
+      <p:nvGrpSpPr>
+        <p:cNvPr id="1" name=""/>
+        <p:cNvGrpSpPr/>
+        <p:nvPr/>
+      </p:nvGrpSpPr>
+      <p:grpSpPr>
+        <a:xfrm>
+          <a:off x="0" y="0"/>
+          <a:ext cx="0" cy="0"/>
+          <a:chOff x="0" y="0"/>
+          <a:chExt cx="0" cy="0"/>
+        </a:xfrm>
+      </p:grpSpPr>
+      <p:sp>
+        <p:nvSpPr>
+          <p:cNvPr id="2" name="Title 1"/>
+          <p:cNvSpPr>
+            <a:spLocks noGrp="1"/>
+          </p:cNvSpPr>
+          <p:nvPr>
+            <p:ph type="title"/>
+          </p:nvPr>
+        </p:nvSpPr>
+        <p:spPr/>
+        <p:txBody>
+          <a:bodyPr/>
+          <a:lstStyle/>
+          <a:p>
+            <a:r>
+              <a:rPr lang="en-US" dirty="0"/>
+              <a:t>Quick note on strings</a:t>
+            </a:r>
+          </a:p>
+        </p:txBody>
+      </p:sp>
+      <p:sp>
+        <p:nvSpPr>
+          <p:cNvPr id="3" name="Content Placeholder 2"/>
+          <p:cNvSpPr>
+            <a:spLocks noGrp="1"/>
+          </p:cNvSpPr>
+          <p:nvPr>
+            <p:ph idx="1"/>
+          </p:nvPr>
+        </p:nvSpPr>
+        <p:spPr>
+          <a:xfrm>
+            <a:off x="838200" y="1465118"/>
+            <a:ext cx="10515600" cy="4711845"/>
+          </a:xfrm>
+        </p:spPr>
+        <p:txBody>
+          <a:bodyPr/>
+          <a:lstStyle/>
+          <a:p>
+            <a:r>
+              <a:rPr lang="en-US" dirty="0"/>
+              <a:t>You can still declare strings using double quote or single quote:</a:t>
+            </a:r>
+          </a:p>
+          <a:p>
             <a:endParaRPr lang="en-US" dirty="0"/>
           </a:p>
-        </p:txBody>
-      </p:sp>
+          <a:p>
+            <a:endParaRPr lang="en-US" dirty="0"/>
+          </a:p>
+          <a:p>
+            <a:endParaRPr lang="en-US" dirty="0"/>
+          </a:p>
+          <a:p>
+            <a:r>
+              <a:rPr lang="en-US" dirty="0"/>
+              <a:t>But you can also use template strings!</a:t>
+            </a:r>
+          </a:p>
+          <a:p>
+            <a:r>
+              <a:rPr lang="en-US" dirty="0"/>
+              <a:t>Multiline AND interpolation… just use </a:t>
+            </a:r>
+            <a:r>
+              <a:rPr lang="en-US" dirty="0" err="1"/>
+              <a:t>backticks</a:t>
+            </a:r>
+            <a:r>
+              <a:rPr lang="en-US" dirty="0"/>
+              <a:t>!</a:t>
+            </a:r>
+          </a:p>
+        </p:txBody>
+      </p:sp>
+      <p:pic>
+        <p:nvPicPr>
+          <p:cNvPr id="4" name="Picture 3"/>
+          <p:cNvPicPr>
+            <a:picLocks noChangeAspect="1"/>
+          </p:cNvPicPr>
+          <p:nvPr/>
+        </p:nvPicPr>
+        <p:blipFill>
+          <a:blip r:embed="rId2"/>
+          <a:stretch>
+            <a:fillRect/>
+          </a:stretch>
+        </p:blipFill>
+        <p:spPr>
+          <a:xfrm>
+            <a:off x="1229151" y="2200202"/>
+            <a:ext cx="4495800" cy="971550"/>
+          </a:xfrm>
+          <a:prstGeom prst="rect">
+            <a:avLst/>
+          </a:prstGeom>
+        </p:spPr>
+      </p:pic>
+      <p:pic>
+        <p:nvPicPr>
+          <p:cNvPr id="5" name="Picture 4"/>
+          <p:cNvPicPr>
+            <a:picLocks noChangeAspect="1"/>
+          </p:cNvPicPr>
+          <p:nvPr/>
+        </p:nvPicPr>
+        <p:blipFill>
+          <a:blip r:embed="rId3"/>
+          <a:stretch>
+            <a:fillRect/>
+          </a:stretch>
+        </p:blipFill>
+        <p:spPr>
+          <a:xfrm>
+            <a:off x="1229151" y="4614393"/>
+            <a:ext cx="3400425" cy="1905000"/>
+          </a:xfrm>
+          <a:prstGeom prst="rect">
+            <a:avLst/>
+          </a:prstGeom>
+        </p:spPr>
+      </p:pic>
+    </p:spTree>
+    <p:extLst>
+      <p:ext uri="{BB962C8B-B14F-4D97-AF65-F5344CB8AC3E}">
+        <p14:creationId xmlns:p14="http://schemas.microsoft.com/office/powerpoint/2010/main" val="2469760295"/>
+      </p:ext>
+    </p:extLst>
+  </p:cSld>
+  <p:clrMapOvr>
+    <a:masterClrMapping/>
+  </p:clrMapOvr>
+  <p:timing>
+    <p:tnLst>
+      <p:par>
+        <p:cTn id="1" dur="indefinite" restart="never" nodeType="tmRoot">
+          <p:childTnLst>
+            <p:seq concurrent="1" nextAc="seek">
+              <p:cTn id="2" dur="indefinite" nodeType="mainSeq">
+                <p:childTnLst>
+                  <p:par>
+                    <p:cTn id="3" fill="hold">
+                      <p:stCondLst>
+                        <p:cond delay="indefinite"/>
+                      </p:stCondLst>
+                      <p:childTnLst>
+                        <p:par>
+                          <p:cTn id="4" fill="hold">
+                            <p:stCondLst>
+                              <p:cond delay="0"/>
+                            </p:stCondLst>
+                            <p:childTnLst>
+                              <p:par>
+                                <p:cTn id="5" presetID="1" presetClass="entr" presetSubtype="0" fill="hold" grpId="0" nodeType="clickEffect">
+                                  <p:stCondLst>
+                                    <p:cond delay="0"/>
+                                  </p:stCondLst>
+                                  <p:childTnLst>
+                                    <p:set>
+                                      <p:cBhvr>
+                                        <p:cTn id="6" dur="1" fill="hold">
+                                          <p:stCondLst>
+                                            <p:cond delay="0"/>
+                                          </p:stCondLst>
+                                        </p:cTn>
+                                        <p:tgtEl>
+                                          <p:spTgt spid="3">
+                                            <p:txEl>
+                                              <p:pRg st="0" end="0"/>
+                                            </p:txEl>
+                                          </p:spTgt>
+                                        </p:tgtEl>
+                                        <p:attrNameLst>
+                                          <p:attrName>style.visibility</p:attrName>
+                                        </p:attrNameLst>
+                                      </p:cBhvr>
+                                      <p:to>
+                                        <p:strVal val="visible"/>
+                                      </p:to>
+                                    </p:set>
+                                  </p:childTnLst>
+                                </p:cTn>
+                              </p:par>
+                            </p:childTnLst>
+                          </p:cTn>
+                        </p:par>
+                      </p:childTnLst>
+                    </p:cTn>
+                  </p:par>
+                  <p:par>
+                    <p:cTn id="7" fill="hold">
+                      <p:stCondLst>
+                        <p:cond delay="indefinite"/>
+                      </p:stCondLst>
+                      <p:childTnLst>
+                        <p:par>
+                          <p:cTn id="8" fill="hold">
+                            <p:stCondLst>
+                              <p:cond delay="0"/>
+                            </p:stCondLst>
+                            <p:childTnLst>
+                              <p:par>
+                                <p:cTn id="9" presetID="1" presetClass="entr" presetSubtype="0" fill="hold" nodeType="clickEffect">
+                                  <p:stCondLst>
+                                    <p:cond delay="0"/>
+                                  </p:stCondLst>
+                                  <p:childTnLst>
+                                    <p:set>
+                                      <p:cBhvr>
+                                        <p:cTn id="10" dur="1" fill="hold">
+                                          <p:stCondLst>
+                                            <p:cond delay="0"/>
+                                          </p:stCondLst>
+                                        </p:cTn>
+                                        <p:tgtEl>
+                                          <p:spTgt spid="4"/>
+                                        </p:tgtEl>
+                                        <p:attrNameLst>
+                                          <p:attrName>style.visibility</p:attrName>
+                                        </p:attrNameLst>
+                                      </p:cBhvr>
+                                      <p:to>
+                                        <p:strVal val="visible"/>
+                                      </p:to>
+                                    </p:set>
+                                  </p:childTnLst>
+                                </p:cTn>
+                              </p:par>
+                            </p:childTnLst>
+                          </p:cTn>
+                        </p:par>
+                      </p:childTnLst>
+                    </p:cTn>
+                  </p:par>
+                  <p:par>
+                    <p:cTn id="11" fill="hold">
+                      <p:stCondLst>
+                        <p:cond delay="indefinite"/>
+                      </p:stCondLst>
+                      <p:childTnLst>
+                        <p:par>
+                          <p:cTn id="12" fill="hold">
+                            <p:stCondLst>
+                              <p:cond delay="0"/>
+                            </p:stCondLst>
+                            <p:childTnLst>
+                              <p:par>
+                                <p:cTn id="13" presetID="1" presetClass="entr" presetSubtype="0" fill="hold" grpId="0" nodeType="clickEffect">
+                                  <p:stCondLst>
+                                    <p:cond delay="0"/>
+                                  </p:stCondLst>
+                                  <p:childTnLst>
+                                    <p:set>
+                                      <p:cBhvr>
+                                        <p:cTn id="14" dur="1" fill="hold">
+                                          <p:stCondLst>
+                                            <p:cond delay="0"/>
+                                          </p:stCondLst>
+                                        </p:cTn>
+                                        <p:tgtEl>
+                                          <p:spTgt spid="3">
+                                            <p:txEl>
+                                              <p:pRg st="4" end="4"/>
+                                            </p:txEl>
+                                          </p:spTgt>
+                                        </p:tgtEl>
+                                        <p:attrNameLst>
+                                          <p:attrName>style.visibility</p:attrName>
+                                        </p:attrNameLst>
+                                      </p:cBhvr>
+                                      <p:to>
+                                        <p:strVal val="visible"/>
+                                      </p:to>
+                                    </p:set>
+                                  </p:childTnLst>
+                                </p:cTn>
+                              </p:par>
+                            </p:childTnLst>
+                          </p:cTn>
+                        </p:par>
+                      </p:childTnLst>
+                    </p:cTn>
+                  </p:par>
+                  <p:par>
+                    <p:cTn id="15" fill="hold">
+                      <p:stCondLst>
+                        <p:cond delay="indefinite"/>
+                      </p:stCondLst>
+                      <p:childTnLst>
+                        <p:par>
+                          <p:cTn id="16" fill="hold">
+                            <p:stCondLst>
+                              <p:cond delay="0"/>
+                            </p:stCondLst>
+                            <p:childTnLst>
+                              <p:par>
+                                <p:cTn id="17" presetID="1" presetClass="entr" presetSubtype="0" fill="hold" grpId="0" nodeType="clickEffect">
+                                  <p:stCondLst>
+                                    <p:cond delay="0"/>
+                                  </p:stCondLst>
+                                  <p:childTnLst>
+                                    <p:set>
+                                      <p:cBhvr>
+                                        <p:cTn id="18" dur="1" fill="hold">
+                                          <p:stCondLst>
+                                            <p:cond delay="0"/>
+                                          </p:stCondLst>
+                                        </p:cTn>
+                                        <p:tgtEl>
+                                          <p:spTgt spid="3">
+                                            <p:txEl>
+                                              <p:pRg st="5" end="5"/>
+                                            </p:txEl>
+                                          </p:spTgt>
+                                        </p:tgtEl>
+                                        <p:attrNameLst>
+                                          <p:attrName>style.visibility</p:attrName>
+                                        </p:attrNameLst>
+                                      </p:cBhvr>
+                                      <p:to>
+                                        <p:strVal val="visible"/>
+                                      </p:to>
+                                    </p:set>
+                                  </p:childTnLst>
+                                </p:cTn>
+                              </p:par>
+                            </p:childTnLst>
+                          </p:cTn>
+                        </p:par>
+                      </p:childTnLst>
+                    </p:cTn>
+                  </p:par>
+                  <p:par>
+                    <p:cTn id="19" fill="hold">
+                      <p:stCondLst>
+                        <p:cond delay="indefinite"/>
+                      </p:stCondLst>
+                      <p:childTnLst>
+                        <p:par>
+                          <p:cTn id="20" fill="hold">
+                            <p:stCondLst>
+                              <p:cond delay="0"/>
+                            </p:stCondLst>
+                            <p:childTnLst>
+                              <p:par>
+                                <p:cTn id="21" presetID="1" presetClass="entr" presetSubtype="0" fill="hold" nodeType="clickEffect">
+                                  <p:stCondLst>
+                                    <p:cond delay="0"/>
+                                  </p:stCondLst>
+                                  <p:childTnLst>
+                                    <p:set>
+                                      <p:cBhvr>
+                                        <p:cTn id="22" dur="1" fill="hold">
+                                          <p:stCondLst>
+                                            <p:cond delay="0"/>
+                                          </p:stCondLst>
+                                        </p:cTn>
+                                        <p:tgtEl>
+                                          <p:spTgt spid="5"/>
+                                        </p:tgtEl>
+                                        <p:attrNameLst>
+                                          <p:attrName>style.visibility</p:attrName>
+                                        </p:attrNameLst>
+                                      </p:cBhvr>
+                                      <p:to>
+                                        <p:strVal val="visible"/>
+                                      </p:to>
+                                    </p:set>
+                                  </p:childTnLst>
+                                </p:cTn>
+                              </p:par>
+                            </p:childTnLst>
+                          </p:cTn>
+                        </p:par>
+                      </p:childTnLst>
+                    </p:cTn>
+                  </p:par>
+                </p:childTnLst>
+              </p:cTn>
+              <p:prevCondLst>
+                <p:cond evt="onPrev" delay="0">
+                  <p:tgtEl>
+                    <p:sldTgt/>
+                  </p:tgtEl>
+                </p:cond>
+              </p:prevCondLst>
+              <p:nextCondLst>
+                <p:cond evt="onNext" delay="0">
+                  <p:tgtEl>
+                    <p:sldTgt/>
+                  </p:tgtEl>
+                </p:cond>
+              </p:nextCondLst>
+            </p:seq>
+          </p:childTnLst>
+        </p:cTn>
+      </p:par>
+    </p:tnLst>
+    <p:bldLst>
+      <p:bldP spid="3" grpId="0" uiExpand="1" build="p"/>
+    </p:bldLst>
+  </p:timing>
+</p:sld>
+</file>
+
+<file path=ppt/slides/slide6.xml><?xml version="1.0" encoding="utf-8"?>
+<p:sld xmlns:a="http://schemas.openxmlformats.org/drawingml/2006/main" xmlns:r="http://schemas.openxmlformats.org/officeDocument/2006/relationships" xmlns:p="http://schemas.openxmlformats.org/presentationml/2006/main">
+  <p:cSld>
+    <p:spTree>
+      <p:nvGrpSpPr>
+        <p:cNvPr id="1" name=""/>
+        <p:cNvGrpSpPr/>
+        <p:nvPr/>
+      </p:nvGrpSpPr>
+      <p:grpSpPr>
+        <a:xfrm>
+          <a:off x="0" y="0"/>
+          <a:ext cx="0" cy="0"/>
+          <a:chOff x="0" y="0"/>
+          <a:chExt cx="0" cy="0"/>
+        </a:xfrm>
+      </p:grpSpPr>
+      <p:sp>
+        <p:nvSpPr>
+          <p:cNvPr id="2" name="Title 1"/>
+          <p:cNvSpPr>
+            <a:spLocks noGrp="1"/>
+          </p:cNvSpPr>
+          <p:nvPr>
+            <p:ph type="title"/>
+          </p:nvPr>
+        </p:nvSpPr>
+        <p:spPr/>
+        <p:txBody>
+          <a:bodyPr/>
+          <a:lstStyle/>
+          <a:p>
+            <a:r>
+              <a:rPr lang="en-US" dirty="0"/>
+              <a:t>Variables</a:t>
+            </a:r>
+          </a:p>
+        </p:txBody>
+      </p:sp>
+      <p:sp>
+        <p:nvSpPr>
+          <p:cNvPr id="3" name="Content Placeholder 2"/>
+          <p:cNvSpPr>
+            <a:spLocks noGrp="1"/>
+          </p:cNvSpPr>
+          <p:nvPr>
+            <p:ph idx="1"/>
+          </p:nvPr>
+        </p:nvSpPr>
+        <p:spPr/>
+        <p:txBody>
+          <a:bodyPr/>
+          <a:lstStyle/>
+          <a:p>
+            <a:r>
+              <a:rPr lang="en-US" dirty="0"/>
+              <a:t>Largely the same as JavaScript</a:t>
+            </a:r>
+          </a:p>
+          <a:p>
+            <a:endParaRPr lang="en-US" dirty="0"/>
+          </a:p>
+          <a:p>
+            <a:endParaRPr lang="en-US" dirty="0"/>
+          </a:p>
+          <a:p>
+            <a:endParaRPr lang="en-US" dirty="0"/>
+          </a:p>
+          <a:p>
+            <a:r>
+              <a:rPr lang="en-US" dirty="0" err="1"/>
+              <a:t>TypeScript</a:t>
+            </a:r>
+            <a:r>
+              <a:rPr lang="en-US" dirty="0"/>
+              <a:t> adds type hints</a:t>
+            </a:r>
+          </a:p>
+          <a:p>
+            <a:endParaRPr lang="en-US" dirty="0"/>
+          </a:p>
+          <a:p>
+            <a:endParaRPr lang="en-US" dirty="0"/>
+          </a:p>
+          <a:p>
+            <a:r>
+              <a:rPr lang="en-US" dirty="0" err="1"/>
+              <a:t>TypeScript</a:t>
+            </a:r>
+            <a:r>
+              <a:rPr lang="en-US" dirty="0"/>
+              <a:t> is strongly typed</a:t>
+            </a:r>
+          </a:p>
+          <a:p>
+            <a:pPr marL="0" indent="0">
+              <a:buNone/>
+            </a:pPr>
+            <a:endParaRPr lang="en-US" dirty="0"/>
+          </a:p>
+        </p:txBody>
+      </p:sp>
+      <p:pic>
+        <p:nvPicPr>
+          <p:cNvPr id="4" name="Picture 3"/>
+          <p:cNvPicPr>
+            <a:picLocks noChangeAspect="1"/>
+          </p:cNvPicPr>
+          <p:nvPr/>
+        </p:nvPicPr>
+        <p:blipFill>
+          <a:blip r:embed="rId2"/>
+          <a:stretch>
+            <a:fillRect/>
+          </a:stretch>
+        </p:blipFill>
+        <p:spPr>
+          <a:xfrm>
+            <a:off x="1287819" y="2432406"/>
+            <a:ext cx="6686550" cy="1190625"/>
+          </a:xfrm>
+          <a:prstGeom prst="rect">
+            <a:avLst/>
+          </a:prstGeom>
+        </p:spPr>
+      </p:pic>
+      <p:pic>
+        <p:nvPicPr>
+          <p:cNvPr id="5" name="Picture 4"/>
+          <p:cNvPicPr>
+            <a:picLocks noChangeAspect="1"/>
+          </p:cNvPicPr>
+          <p:nvPr/>
+        </p:nvPicPr>
+        <p:blipFill>
+          <a:blip r:embed="rId3"/>
+          <a:stretch>
+            <a:fillRect/>
+          </a:stretch>
+        </p:blipFill>
+        <p:spPr>
+          <a:xfrm>
+            <a:off x="1287819" y="4528522"/>
+            <a:ext cx="2209800" cy="742950"/>
+          </a:xfrm>
+          <a:prstGeom prst="rect">
+            <a:avLst/>
+          </a:prstGeom>
+        </p:spPr>
+      </p:pic>
     </p:spTree>
     <p:extLst>
       <p:ext uri="{BB962C8B-B14F-4D97-AF65-F5344CB8AC3E}">
@@ -3227,6 +6420,1111 @@
   <p:clrMapOvr>
     <a:masterClrMapping/>
   </p:clrMapOvr>
+  <p:timing>
+    <p:tnLst>
+      <p:par>
+        <p:cTn id="1" dur="indefinite" restart="never" nodeType="tmRoot">
+          <p:childTnLst>
+            <p:seq concurrent="1" nextAc="seek">
+              <p:cTn id="2" dur="indefinite" nodeType="mainSeq">
+                <p:childTnLst>
+                  <p:par>
+                    <p:cTn id="3" fill="hold">
+                      <p:stCondLst>
+                        <p:cond delay="indefinite"/>
+                      </p:stCondLst>
+                      <p:childTnLst>
+                        <p:par>
+                          <p:cTn id="4" fill="hold">
+                            <p:stCondLst>
+                              <p:cond delay="0"/>
+                            </p:stCondLst>
+                            <p:childTnLst>
+                              <p:par>
+                                <p:cTn id="5" presetID="1" presetClass="entr" presetSubtype="0" fill="hold" grpId="0" nodeType="clickEffect">
+                                  <p:stCondLst>
+                                    <p:cond delay="0"/>
+                                  </p:stCondLst>
+                                  <p:childTnLst>
+                                    <p:set>
+                                      <p:cBhvr>
+                                        <p:cTn id="6" dur="1" fill="hold">
+                                          <p:stCondLst>
+                                            <p:cond delay="0"/>
+                                          </p:stCondLst>
+                                        </p:cTn>
+                                        <p:tgtEl>
+                                          <p:spTgt spid="3">
+                                            <p:txEl>
+                                              <p:pRg st="0" end="0"/>
+                                            </p:txEl>
+                                          </p:spTgt>
+                                        </p:tgtEl>
+                                        <p:attrNameLst>
+                                          <p:attrName>style.visibility</p:attrName>
+                                        </p:attrNameLst>
+                                      </p:cBhvr>
+                                      <p:to>
+                                        <p:strVal val="visible"/>
+                                      </p:to>
+                                    </p:set>
+                                  </p:childTnLst>
+                                </p:cTn>
+                              </p:par>
+                            </p:childTnLst>
+                          </p:cTn>
+                        </p:par>
+                      </p:childTnLst>
+                    </p:cTn>
+                  </p:par>
+                  <p:par>
+                    <p:cTn id="7" fill="hold">
+                      <p:stCondLst>
+                        <p:cond delay="indefinite"/>
+                      </p:stCondLst>
+                      <p:childTnLst>
+                        <p:par>
+                          <p:cTn id="8" fill="hold">
+                            <p:stCondLst>
+                              <p:cond delay="0"/>
+                            </p:stCondLst>
+                            <p:childTnLst>
+                              <p:par>
+                                <p:cTn id="9" presetID="1" presetClass="entr" presetSubtype="0" fill="hold" nodeType="clickEffect">
+                                  <p:stCondLst>
+                                    <p:cond delay="0"/>
+                                  </p:stCondLst>
+                                  <p:childTnLst>
+                                    <p:set>
+                                      <p:cBhvr>
+                                        <p:cTn id="10" dur="1" fill="hold">
+                                          <p:stCondLst>
+                                            <p:cond delay="0"/>
+                                          </p:stCondLst>
+                                        </p:cTn>
+                                        <p:tgtEl>
+                                          <p:spTgt spid="4"/>
+                                        </p:tgtEl>
+                                        <p:attrNameLst>
+                                          <p:attrName>style.visibility</p:attrName>
+                                        </p:attrNameLst>
+                                      </p:cBhvr>
+                                      <p:to>
+                                        <p:strVal val="visible"/>
+                                      </p:to>
+                                    </p:set>
+                                  </p:childTnLst>
+                                </p:cTn>
+                              </p:par>
+                            </p:childTnLst>
+                          </p:cTn>
+                        </p:par>
+                      </p:childTnLst>
+                    </p:cTn>
+                  </p:par>
+                  <p:par>
+                    <p:cTn id="11" fill="hold">
+                      <p:stCondLst>
+                        <p:cond delay="indefinite"/>
+                      </p:stCondLst>
+                      <p:childTnLst>
+                        <p:par>
+                          <p:cTn id="12" fill="hold">
+                            <p:stCondLst>
+                              <p:cond delay="0"/>
+                            </p:stCondLst>
+                            <p:childTnLst>
+                              <p:par>
+                                <p:cTn id="13" presetID="1" presetClass="entr" presetSubtype="0" fill="hold" grpId="0" nodeType="clickEffect">
+                                  <p:stCondLst>
+                                    <p:cond delay="0"/>
+                                  </p:stCondLst>
+                                  <p:childTnLst>
+                                    <p:set>
+                                      <p:cBhvr>
+                                        <p:cTn id="14" dur="1" fill="hold">
+                                          <p:stCondLst>
+                                            <p:cond delay="0"/>
+                                          </p:stCondLst>
+                                        </p:cTn>
+                                        <p:tgtEl>
+                                          <p:spTgt spid="3">
+                                            <p:txEl>
+                                              <p:pRg st="4" end="4"/>
+                                            </p:txEl>
+                                          </p:spTgt>
+                                        </p:tgtEl>
+                                        <p:attrNameLst>
+                                          <p:attrName>style.visibility</p:attrName>
+                                        </p:attrNameLst>
+                                      </p:cBhvr>
+                                      <p:to>
+                                        <p:strVal val="visible"/>
+                                      </p:to>
+                                    </p:set>
+                                  </p:childTnLst>
+                                </p:cTn>
+                              </p:par>
+                            </p:childTnLst>
+                          </p:cTn>
+                        </p:par>
+                      </p:childTnLst>
+                    </p:cTn>
+                  </p:par>
+                  <p:par>
+                    <p:cTn id="15" fill="hold">
+                      <p:stCondLst>
+                        <p:cond delay="indefinite"/>
+                      </p:stCondLst>
+                      <p:childTnLst>
+                        <p:par>
+                          <p:cTn id="16" fill="hold">
+                            <p:stCondLst>
+                              <p:cond delay="0"/>
+                            </p:stCondLst>
+                            <p:childTnLst>
+                              <p:par>
+                                <p:cTn id="17" presetID="1" presetClass="entr" presetSubtype="0" fill="hold" nodeType="clickEffect">
+                                  <p:stCondLst>
+                                    <p:cond delay="0"/>
+                                  </p:stCondLst>
+                                  <p:childTnLst>
+                                    <p:set>
+                                      <p:cBhvr>
+                                        <p:cTn id="18" dur="1" fill="hold">
+                                          <p:stCondLst>
+                                            <p:cond delay="0"/>
+                                          </p:stCondLst>
+                                        </p:cTn>
+                                        <p:tgtEl>
+                                          <p:spTgt spid="5"/>
+                                        </p:tgtEl>
+                                        <p:attrNameLst>
+                                          <p:attrName>style.visibility</p:attrName>
+                                        </p:attrNameLst>
+                                      </p:cBhvr>
+                                      <p:to>
+                                        <p:strVal val="visible"/>
+                                      </p:to>
+                                    </p:set>
+                                  </p:childTnLst>
+                                </p:cTn>
+                              </p:par>
+                            </p:childTnLst>
+                          </p:cTn>
+                        </p:par>
+                      </p:childTnLst>
+                    </p:cTn>
+                  </p:par>
+                  <p:par>
+                    <p:cTn id="19" fill="hold">
+                      <p:stCondLst>
+                        <p:cond delay="indefinite"/>
+                      </p:stCondLst>
+                      <p:childTnLst>
+                        <p:par>
+                          <p:cTn id="20" fill="hold">
+                            <p:stCondLst>
+                              <p:cond delay="0"/>
+                            </p:stCondLst>
+                            <p:childTnLst>
+                              <p:par>
+                                <p:cTn id="21" presetID="1" presetClass="entr" presetSubtype="0" fill="hold" grpId="0" nodeType="clickEffect">
+                                  <p:stCondLst>
+                                    <p:cond delay="0"/>
+                                  </p:stCondLst>
+                                  <p:childTnLst>
+                                    <p:set>
+                                      <p:cBhvr>
+                                        <p:cTn id="22" dur="1" fill="hold">
+                                          <p:stCondLst>
+                                            <p:cond delay="0"/>
+                                          </p:stCondLst>
+                                        </p:cTn>
+                                        <p:tgtEl>
+                                          <p:spTgt spid="3">
+                                            <p:txEl>
+                                              <p:pRg st="7" end="7"/>
+                                            </p:txEl>
+                                          </p:spTgt>
+                                        </p:tgtEl>
+                                        <p:attrNameLst>
+                                          <p:attrName>style.visibility</p:attrName>
+                                        </p:attrNameLst>
+                                      </p:cBhvr>
+                                      <p:to>
+                                        <p:strVal val="visible"/>
+                                      </p:to>
+                                    </p:set>
+                                  </p:childTnLst>
+                                </p:cTn>
+                              </p:par>
+                            </p:childTnLst>
+                          </p:cTn>
+                        </p:par>
+                      </p:childTnLst>
+                    </p:cTn>
+                  </p:par>
+                </p:childTnLst>
+              </p:cTn>
+              <p:prevCondLst>
+                <p:cond evt="onPrev" delay="0">
+                  <p:tgtEl>
+                    <p:sldTgt/>
+                  </p:tgtEl>
+                </p:cond>
+              </p:prevCondLst>
+              <p:nextCondLst>
+                <p:cond evt="onNext" delay="0">
+                  <p:tgtEl>
+                    <p:sldTgt/>
+                  </p:tgtEl>
+                </p:cond>
+              </p:nextCondLst>
+            </p:seq>
+          </p:childTnLst>
+        </p:cTn>
+      </p:par>
+    </p:tnLst>
+    <p:bldLst>
+      <p:bldP spid="3" grpId="0" uiExpand="1" build="p"/>
+    </p:bldLst>
+  </p:timing>
+</p:sld>
+</file>
+
+<file path=ppt/slides/slide7.xml><?xml version="1.0" encoding="utf-8"?>
+<p:sld xmlns:a="http://schemas.openxmlformats.org/drawingml/2006/main" xmlns:r="http://schemas.openxmlformats.org/officeDocument/2006/relationships" xmlns:p="http://schemas.openxmlformats.org/presentationml/2006/main">
+  <p:cSld>
+    <p:spTree>
+      <p:nvGrpSpPr>
+        <p:cNvPr id="1" name=""/>
+        <p:cNvGrpSpPr/>
+        <p:nvPr/>
+      </p:nvGrpSpPr>
+      <p:grpSpPr>
+        <a:xfrm>
+          <a:off x="0" y="0"/>
+          <a:ext cx="0" cy="0"/>
+          <a:chOff x="0" y="0"/>
+          <a:chExt cx="0" cy="0"/>
+        </a:xfrm>
+      </p:grpSpPr>
+      <p:sp>
+        <p:nvSpPr>
+          <p:cNvPr id="2" name="Title 1"/>
+          <p:cNvSpPr>
+            <a:spLocks noGrp="1"/>
+          </p:cNvSpPr>
+          <p:nvPr>
+            <p:ph type="title"/>
+          </p:nvPr>
+        </p:nvSpPr>
+        <p:spPr/>
+        <p:txBody>
+          <a:bodyPr/>
+          <a:lstStyle/>
+          <a:p>
+            <a:r>
+              <a:rPr lang="en-US" dirty="0"/>
+              <a:t>Variables, cont’d</a:t>
+            </a:r>
+          </a:p>
+        </p:txBody>
+      </p:sp>
+      <p:sp>
+        <p:nvSpPr>
+          <p:cNvPr id="3" name="Content Placeholder 2"/>
+          <p:cNvSpPr>
+            <a:spLocks noGrp="1"/>
+          </p:cNvSpPr>
+          <p:nvPr>
+            <p:ph idx="1"/>
+          </p:nvPr>
+        </p:nvSpPr>
+        <p:spPr/>
+        <p:txBody>
+          <a:bodyPr/>
+          <a:lstStyle/>
+          <a:p>
+            <a:r>
+              <a:rPr lang="en-US" dirty="0"/>
+              <a:t>Notice something strange?</a:t>
+            </a:r>
+            <a:br>
+              <a:rPr lang="en-US" dirty="0"/>
+            </a:br>
+            <a:endParaRPr lang="en-US" dirty="0"/>
+          </a:p>
+          <a:p>
+            <a:endParaRPr lang="en-US" dirty="0"/>
+          </a:p>
+          <a:p>
+            <a:endParaRPr lang="en-US" dirty="0"/>
+          </a:p>
+          <a:p>
+            <a:r>
+              <a:rPr lang="en-US" dirty="0"/>
+              <a:t>Yes, it’s declared twice – and that’s totally valid</a:t>
+            </a:r>
+          </a:p>
+          <a:p>
+            <a:r>
+              <a:rPr lang="en-US" dirty="0"/>
+              <a:t>Use let instead – it’s safer</a:t>
+            </a:r>
+          </a:p>
+        </p:txBody>
+      </p:sp>
+      <p:pic>
+        <p:nvPicPr>
+          <p:cNvPr id="4" name="Picture 3"/>
+          <p:cNvPicPr>
+            <a:picLocks noChangeAspect="1"/>
+          </p:cNvPicPr>
+          <p:nvPr/>
+        </p:nvPicPr>
+        <p:blipFill>
+          <a:blip r:embed="rId2"/>
+          <a:stretch>
+            <a:fillRect/>
+          </a:stretch>
+        </p:blipFill>
+        <p:spPr>
+          <a:xfrm>
+            <a:off x="1237695" y="2421857"/>
+            <a:ext cx="6686550" cy="1190625"/>
+          </a:xfrm>
+          <a:prstGeom prst="rect">
+            <a:avLst/>
+          </a:prstGeom>
+        </p:spPr>
+      </p:pic>
+      <p:pic>
+        <p:nvPicPr>
+          <p:cNvPr id="5" name="Picture 4"/>
+          <p:cNvPicPr>
+            <a:picLocks noChangeAspect="1"/>
+          </p:cNvPicPr>
+          <p:nvPr/>
+        </p:nvPicPr>
+        <p:blipFill>
+          <a:blip r:embed="rId3"/>
+          <a:stretch>
+            <a:fillRect/>
+          </a:stretch>
+        </p:blipFill>
+        <p:spPr>
+          <a:xfrm>
+            <a:off x="1347232" y="4795109"/>
+            <a:ext cx="6467475" cy="1162050"/>
+          </a:xfrm>
+          <a:prstGeom prst="rect">
+            <a:avLst/>
+          </a:prstGeom>
+        </p:spPr>
+      </p:pic>
+    </p:spTree>
+    <p:extLst>
+      <p:ext uri="{BB962C8B-B14F-4D97-AF65-F5344CB8AC3E}">
+        <p14:creationId xmlns:p14="http://schemas.microsoft.com/office/powerpoint/2010/main" val="116255676"/>
+      </p:ext>
+    </p:extLst>
+  </p:cSld>
+  <p:clrMapOvr>
+    <a:masterClrMapping/>
+  </p:clrMapOvr>
+  <p:timing>
+    <p:tnLst>
+      <p:par>
+        <p:cTn id="1" dur="indefinite" restart="never" nodeType="tmRoot">
+          <p:childTnLst>
+            <p:seq concurrent="1" nextAc="seek">
+              <p:cTn id="2" dur="indefinite" nodeType="mainSeq">
+                <p:childTnLst>
+                  <p:par>
+                    <p:cTn id="3" fill="hold">
+                      <p:stCondLst>
+                        <p:cond delay="indefinite"/>
+                      </p:stCondLst>
+                      <p:childTnLst>
+                        <p:par>
+                          <p:cTn id="4" fill="hold">
+                            <p:stCondLst>
+                              <p:cond delay="0"/>
+                            </p:stCondLst>
+                            <p:childTnLst>
+                              <p:par>
+                                <p:cTn id="5" presetID="1" presetClass="entr" presetSubtype="0" fill="hold" grpId="0" nodeType="clickEffect">
+                                  <p:stCondLst>
+                                    <p:cond delay="0"/>
+                                  </p:stCondLst>
+                                  <p:childTnLst>
+                                    <p:set>
+                                      <p:cBhvr>
+                                        <p:cTn id="6" dur="1" fill="hold">
+                                          <p:stCondLst>
+                                            <p:cond delay="0"/>
+                                          </p:stCondLst>
+                                        </p:cTn>
+                                        <p:tgtEl>
+                                          <p:spTgt spid="3">
+                                            <p:txEl>
+                                              <p:pRg st="0" end="0"/>
+                                            </p:txEl>
+                                          </p:spTgt>
+                                        </p:tgtEl>
+                                        <p:attrNameLst>
+                                          <p:attrName>style.visibility</p:attrName>
+                                        </p:attrNameLst>
+                                      </p:cBhvr>
+                                      <p:to>
+                                        <p:strVal val="visible"/>
+                                      </p:to>
+                                    </p:set>
+                                  </p:childTnLst>
+                                </p:cTn>
+                              </p:par>
+                            </p:childTnLst>
+                          </p:cTn>
+                        </p:par>
+                      </p:childTnLst>
+                    </p:cTn>
+                  </p:par>
+                  <p:par>
+                    <p:cTn id="7" fill="hold">
+                      <p:stCondLst>
+                        <p:cond delay="indefinite"/>
+                      </p:stCondLst>
+                      <p:childTnLst>
+                        <p:par>
+                          <p:cTn id="8" fill="hold">
+                            <p:stCondLst>
+                              <p:cond delay="0"/>
+                            </p:stCondLst>
+                            <p:childTnLst>
+                              <p:par>
+                                <p:cTn id="9" presetID="1" presetClass="entr" presetSubtype="0" fill="hold" nodeType="clickEffect">
+                                  <p:stCondLst>
+                                    <p:cond delay="0"/>
+                                  </p:stCondLst>
+                                  <p:childTnLst>
+                                    <p:set>
+                                      <p:cBhvr>
+                                        <p:cTn id="10" dur="1" fill="hold">
+                                          <p:stCondLst>
+                                            <p:cond delay="0"/>
+                                          </p:stCondLst>
+                                        </p:cTn>
+                                        <p:tgtEl>
+                                          <p:spTgt spid="4"/>
+                                        </p:tgtEl>
+                                        <p:attrNameLst>
+                                          <p:attrName>style.visibility</p:attrName>
+                                        </p:attrNameLst>
+                                      </p:cBhvr>
+                                      <p:to>
+                                        <p:strVal val="visible"/>
+                                      </p:to>
+                                    </p:set>
+                                  </p:childTnLst>
+                                </p:cTn>
+                              </p:par>
+                            </p:childTnLst>
+                          </p:cTn>
+                        </p:par>
+                      </p:childTnLst>
+                    </p:cTn>
+                  </p:par>
+                  <p:par>
+                    <p:cTn id="11" fill="hold">
+                      <p:stCondLst>
+                        <p:cond delay="indefinite"/>
+                      </p:stCondLst>
+                      <p:childTnLst>
+                        <p:par>
+                          <p:cTn id="12" fill="hold">
+                            <p:stCondLst>
+                              <p:cond delay="0"/>
+                            </p:stCondLst>
+                            <p:childTnLst>
+                              <p:par>
+                                <p:cTn id="13" presetID="1" presetClass="entr" presetSubtype="0" fill="hold" grpId="0" nodeType="clickEffect">
+                                  <p:stCondLst>
+                                    <p:cond delay="0"/>
+                                  </p:stCondLst>
+                                  <p:childTnLst>
+                                    <p:set>
+                                      <p:cBhvr>
+                                        <p:cTn id="14" dur="1" fill="hold">
+                                          <p:stCondLst>
+                                            <p:cond delay="0"/>
+                                          </p:stCondLst>
+                                        </p:cTn>
+                                        <p:tgtEl>
+                                          <p:spTgt spid="3">
+                                            <p:txEl>
+                                              <p:pRg st="3" end="3"/>
+                                            </p:txEl>
+                                          </p:spTgt>
+                                        </p:tgtEl>
+                                        <p:attrNameLst>
+                                          <p:attrName>style.visibility</p:attrName>
+                                        </p:attrNameLst>
+                                      </p:cBhvr>
+                                      <p:to>
+                                        <p:strVal val="visible"/>
+                                      </p:to>
+                                    </p:set>
+                                  </p:childTnLst>
+                                </p:cTn>
+                              </p:par>
+                            </p:childTnLst>
+                          </p:cTn>
+                        </p:par>
+                      </p:childTnLst>
+                    </p:cTn>
+                  </p:par>
+                  <p:par>
+                    <p:cTn id="15" fill="hold">
+                      <p:stCondLst>
+                        <p:cond delay="indefinite"/>
+                      </p:stCondLst>
+                      <p:childTnLst>
+                        <p:par>
+                          <p:cTn id="16" fill="hold">
+                            <p:stCondLst>
+                              <p:cond delay="0"/>
+                            </p:stCondLst>
+                            <p:childTnLst>
+                              <p:par>
+                                <p:cTn id="17" presetID="1" presetClass="entr" presetSubtype="0" fill="hold" grpId="0" nodeType="clickEffect">
+                                  <p:stCondLst>
+                                    <p:cond delay="0"/>
+                                  </p:stCondLst>
+                                  <p:childTnLst>
+                                    <p:set>
+                                      <p:cBhvr>
+                                        <p:cTn id="18" dur="1" fill="hold">
+                                          <p:stCondLst>
+                                            <p:cond delay="0"/>
+                                          </p:stCondLst>
+                                        </p:cTn>
+                                        <p:tgtEl>
+                                          <p:spTgt spid="3">
+                                            <p:txEl>
+                                              <p:pRg st="4" end="4"/>
+                                            </p:txEl>
+                                          </p:spTgt>
+                                        </p:tgtEl>
+                                        <p:attrNameLst>
+                                          <p:attrName>style.visibility</p:attrName>
+                                        </p:attrNameLst>
+                                      </p:cBhvr>
+                                      <p:to>
+                                        <p:strVal val="visible"/>
+                                      </p:to>
+                                    </p:set>
+                                  </p:childTnLst>
+                                </p:cTn>
+                              </p:par>
+                            </p:childTnLst>
+                          </p:cTn>
+                        </p:par>
+                      </p:childTnLst>
+                    </p:cTn>
+                  </p:par>
+                  <p:par>
+                    <p:cTn id="19" fill="hold">
+                      <p:stCondLst>
+                        <p:cond delay="indefinite"/>
+                      </p:stCondLst>
+                      <p:childTnLst>
+                        <p:par>
+                          <p:cTn id="20" fill="hold">
+                            <p:stCondLst>
+                              <p:cond delay="0"/>
+                            </p:stCondLst>
+                            <p:childTnLst>
+                              <p:par>
+                                <p:cTn id="21" presetID="1" presetClass="entr" presetSubtype="0" fill="hold" nodeType="clickEffect">
+                                  <p:stCondLst>
+                                    <p:cond delay="0"/>
+                                  </p:stCondLst>
+                                  <p:childTnLst>
+                                    <p:set>
+                                      <p:cBhvr>
+                                        <p:cTn id="22" dur="1" fill="hold">
+                                          <p:stCondLst>
+                                            <p:cond delay="0"/>
+                                          </p:stCondLst>
+                                        </p:cTn>
+                                        <p:tgtEl>
+                                          <p:spTgt spid="5"/>
+                                        </p:tgtEl>
+                                        <p:attrNameLst>
+                                          <p:attrName>style.visibility</p:attrName>
+                                        </p:attrNameLst>
+                                      </p:cBhvr>
+                                      <p:to>
+                                        <p:strVal val="visible"/>
+                                      </p:to>
+                                    </p:set>
+                                  </p:childTnLst>
+                                </p:cTn>
+                              </p:par>
+                            </p:childTnLst>
+                          </p:cTn>
+                        </p:par>
+                      </p:childTnLst>
+                    </p:cTn>
+                  </p:par>
+                </p:childTnLst>
+              </p:cTn>
+              <p:prevCondLst>
+                <p:cond evt="onPrev" delay="0">
+                  <p:tgtEl>
+                    <p:sldTgt/>
+                  </p:tgtEl>
+                </p:cond>
+              </p:prevCondLst>
+              <p:nextCondLst>
+                <p:cond evt="onNext" delay="0">
+                  <p:tgtEl>
+                    <p:sldTgt/>
+                  </p:tgtEl>
+                </p:cond>
+              </p:nextCondLst>
+            </p:seq>
+          </p:childTnLst>
+        </p:cTn>
+      </p:par>
+    </p:tnLst>
+    <p:bldLst>
+      <p:bldP spid="3" grpId="0" uiExpand="1" build="p"/>
+    </p:bldLst>
+  </p:timing>
+</p:sld>
+</file>
+
+<file path=ppt/slides/slide8.xml><?xml version="1.0" encoding="utf-8"?>
+<p:sld xmlns:a="http://schemas.openxmlformats.org/drawingml/2006/main" xmlns:r="http://schemas.openxmlformats.org/officeDocument/2006/relationships" xmlns:p="http://schemas.openxmlformats.org/presentationml/2006/main">
+  <p:cSld>
+    <p:spTree>
+      <p:nvGrpSpPr>
+        <p:cNvPr id="1" name=""/>
+        <p:cNvGrpSpPr/>
+        <p:nvPr/>
+      </p:nvGrpSpPr>
+      <p:grpSpPr>
+        <a:xfrm>
+          <a:off x="0" y="0"/>
+          <a:ext cx="0" cy="0"/>
+          <a:chOff x="0" y="0"/>
+          <a:chExt cx="0" cy="0"/>
+        </a:xfrm>
+      </p:grpSpPr>
+      <p:sp>
+        <p:nvSpPr>
+          <p:cNvPr id="2" name="Title 1"/>
+          <p:cNvSpPr>
+            <a:spLocks noGrp="1"/>
+          </p:cNvSpPr>
+          <p:nvPr>
+            <p:ph type="title"/>
+          </p:nvPr>
+        </p:nvSpPr>
+        <p:spPr>
+          <a:xfrm>
+            <a:off x="838200" y="365125"/>
+            <a:ext cx="10515600" cy="762339"/>
+          </a:xfrm>
+        </p:spPr>
+        <p:txBody>
+          <a:bodyPr/>
+          <a:lstStyle/>
+          <a:p>
+            <a:r>
+              <a:rPr lang="en-US" dirty="0"/>
+              <a:t>Interfaces</a:t>
+            </a:r>
+          </a:p>
+        </p:txBody>
+      </p:sp>
+      <p:sp>
+        <p:nvSpPr>
+          <p:cNvPr id="3" name="Content Placeholder 2"/>
+          <p:cNvSpPr>
+            <a:spLocks noGrp="1"/>
+          </p:cNvSpPr>
+          <p:nvPr>
+            <p:ph idx="1"/>
+          </p:nvPr>
+        </p:nvSpPr>
+        <p:spPr>
+          <a:xfrm>
+            <a:off x="838200" y="1127464"/>
+            <a:ext cx="10515600" cy="5049499"/>
+          </a:xfrm>
+        </p:spPr>
+        <p:txBody>
+          <a:bodyPr/>
+          <a:lstStyle/>
+          <a:p>
+            <a:r>
+              <a:rPr lang="en-US" dirty="0"/>
+              <a:t>Classes without functionality – just like C#</a:t>
+            </a:r>
+          </a:p>
+          <a:p>
+            <a:endParaRPr lang="en-US" dirty="0"/>
+          </a:p>
+        </p:txBody>
+      </p:sp>
+      <p:pic>
+        <p:nvPicPr>
+          <p:cNvPr id="5" name="Picture 4"/>
+          <p:cNvPicPr>
+            <a:picLocks noChangeAspect="1"/>
+          </p:cNvPicPr>
+          <p:nvPr/>
+        </p:nvPicPr>
+        <p:blipFill>
+          <a:blip r:embed="rId2"/>
+          <a:stretch>
+            <a:fillRect/>
+          </a:stretch>
+        </p:blipFill>
+        <p:spPr>
+          <a:xfrm>
+            <a:off x="1384917" y="1722827"/>
+            <a:ext cx="9880846" cy="4916245"/>
+          </a:xfrm>
+          <a:prstGeom prst="rect">
+            <a:avLst/>
+          </a:prstGeom>
+        </p:spPr>
+      </p:pic>
+    </p:spTree>
+    <p:extLst>
+      <p:ext uri="{BB962C8B-B14F-4D97-AF65-F5344CB8AC3E}">
+        <p14:creationId xmlns:p14="http://schemas.microsoft.com/office/powerpoint/2010/main" val="814693541"/>
+      </p:ext>
+    </p:extLst>
+  </p:cSld>
+  <p:clrMapOvr>
+    <a:masterClrMapping/>
+  </p:clrMapOvr>
+</p:sld>
+</file>
+
+<file path=ppt/slides/slide9.xml><?xml version="1.0" encoding="utf-8"?>
+<p:sld xmlns:a="http://schemas.openxmlformats.org/drawingml/2006/main" xmlns:r="http://schemas.openxmlformats.org/officeDocument/2006/relationships" xmlns:p="http://schemas.openxmlformats.org/presentationml/2006/main">
+  <p:cSld>
+    <p:spTree>
+      <p:nvGrpSpPr>
+        <p:cNvPr id="1" name=""/>
+        <p:cNvGrpSpPr/>
+        <p:nvPr/>
+      </p:nvGrpSpPr>
+      <p:grpSpPr>
+        <a:xfrm>
+          <a:off x="0" y="0"/>
+          <a:ext cx="0" cy="0"/>
+          <a:chOff x="0" y="0"/>
+          <a:chExt cx="0" cy="0"/>
+        </a:xfrm>
+      </p:grpSpPr>
+      <p:sp>
+        <p:nvSpPr>
+          <p:cNvPr id="2" name="Title 1"/>
+          <p:cNvSpPr>
+            <a:spLocks noGrp="1"/>
+          </p:cNvSpPr>
+          <p:nvPr>
+            <p:ph type="title"/>
+          </p:nvPr>
+        </p:nvSpPr>
+        <p:spPr>
+          <a:xfrm>
+            <a:off x="838200" y="365125"/>
+            <a:ext cx="10515600" cy="966525"/>
+          </a:xfrm>
+        </p:spPr>
+        <p:txBody>
+          <a:bodyPr/>
+          <a:lstStyle/>
+          <a:p>
+            <a:r>
+              <a:rPr lang="en-US" dirty="0"/>
+              <a:t>Interfaces, cont’d</a:t>
+            </a:r>
+          </a:p>
+        </p:txBody>
+      </p:sp>
+      <p:pic>
+        <p:nvPicPr>
+          <p:cNvPr id="4" name="Picture 3"/>
+          <p:cNvPicPr>
+            <a:picLocks noChangeAspect="1"/>
+          </p:cNvPicPr>
+          <p:nvPr/>
+        </p:nvPicPr>
+        <p:blipFill>
+          <a:blip r:embed="rId2"/>
+          <a:stretch>
+            <a:fillRect/>
+          </a:stretch>
+        </p:blipFill>
+        <p:spPr>
+          <a:xfrm>
+            <a:off x="1162976" y="1239993"/>
+            <a:ext cx="3874296" cy="2639549"/>
+          </a:xfrm>
+          <a:prstGeom prst="rect">
+            <a:avLst/>
+          </a:prstGeom>
+        </p:spPr>
+      </p:pic>
+      <p:pic>
+        <p:nvPicPr>
+          <p:cNvPr id="5" name="Picture 4"/>
+          <p:cNvPicPr>
+            <a:picLocks noChangeAspect="1"/>
+          </p:cNvPicPr>
+          <p:nvPr/>
+        </p:nvPicPr>
+        <p:blipFill>
+          <a:blip r:embed="rId3"/>
+          <a:stretch>
+            <a:fillRect/>
+          </a:stretch>
+        </p:blipFill>
+        <p:spPr>
+          <a:xfrm>
+            <a:off x="5589504" y="3069051"/>
+            <a:ext cx="5915025" cy="2266950"/>
+          </a:xfrm>
+          <a:prstGeom prst="rect">
+            <a:avLst/>
+          </a:prstGeom>
+        </p:spPr>
+      </p:pic>
+      <p:sp>
+        <p:nvSpPr>
+          <p:cNvPr id="6" name="Content Placeholder 2"/>
+          <p:cNvSpPr>
+            <a:spLocks noGrp="1"/>
+          </p:cNvSpPr>
+          <p:nvPr>
+            <p:ph idx="1"/>
+          </p:nvPr>
+        </p:nvSpPr>
+        <p:spPr>
+          <a:xfrm>
+            <a:off x="5694218" y="1127464"/>
+            <a:ext cx="5659582" cy="5049499"/>
+          </a:xfrm>
+        </p:spPr>
+        <p:txBody>
+          <a:bodyPr/>
+          <a:lstStyle/>
+          <a:p>
+            <a:endParaRPr lang="en-US" dirty="0"/>
+          </a:p>
+          <a:p>
+            <a:r>
+              <a:rPr lang="en-US" dirty="0"/>
+              <a:t>Won’t let you add type hint without fulfilling the entire contract!</a:t>
+            </a:r>
+          </a:p>
+          <a:p>
+            <a:endParaRPr lang="en-US" dirty="0"/>
+          </a:p>
+        </p:txBody>
+      </p:sp>
+    </p:spTree>
+    <p:extLst>
+      <p:ext uri="{BB962C8B-B14F-4D97-AF65-F5344CB8AC3E}">
+        <p14:creationId xmlns:p14="http://schemas.microsoft.com/office/powerpoint/2010/main" val="1685766904"/>
+      </p:ext>
+    </p:extLst>
+  </p:cSld>
+  <p:clrMapOvr>
+    <a:masterClrMapping/>
+  </p:clrMapOvr>
+  <p:timing>
+    <p:tnLst>
+      <p:par>
+        <p:cTn id="1" dur="indefinite" restart="never" nodeType="tmRoot">
+          <p:childTnLst>
+            <p:seq concurrent="1" nextAc="seek">
+              <p:cTn id="2" dur="indefinite" nodeType="mainSeq">
+                <p:childTnLst>
+                  <p:par>
+                    <p:cTn id="3" fill="hold">
+                      <p:stCondLst>
+                        <p:cond delay="indefinite"/>
+                      </p:stCondLst>
+                      <p:childTnLst>
+                        <p:par>
+                          <p:cTn id="4" fill="hold">
+                            <p:stCondLst>
+                              <p:cond delay="0"/>
+                            </p:stCondLst>
+                            <p:childTnLst>
+                              <p:par>
+                                <p:cTn id="5" presetID="1" presetClass="entr" presetSubtype="0" fill="hold" nodeType="clickEffect">
+                                  <p:stCondLst>
+                                    <p:cond delay="0"/>
+                                  </p:stCondLst>
+                                  <p:childTnLst>
+                                    <p:set>
+                                      <p:cBhvr>
+                                        <p:cTn id="6" dur="1" fill="hold">
+                                          <p:stCondLst>
+                                            <p:cond delay="0"/>
+                                          </p:stCondLst>
+                                        </p:cTn>
+                                        <p:tgtEl>
+                                          <p:spTgt spid="4"/>
+                                        </p:tgtEl>
+                                        <p:attrNameLst>
+                                          <p:attrName>style.visibility</p:attrName>
+                                        </p:attrNameLst>
+                                      </p:cBhvr>
+                                      <p:to>
+                                        <p:strVal val="visible"/>
+                                      </p:to>
+                                    </p:set>
+                                  </p:childTnLst>
+                                </p:cTn>
+                              </p:par>
+                            </p:childTnLst>
+                          </p:cTn>
+                        </p:par>
+                      </p:childTnLst>
+                    </p:cTn>
+                  </p:par>
+                  <p:par>
+                    <p:cTn id="7" fill="hold">
+                      <p:stCondLst>
+                        <p:cond delay="indefinite"/>
+                      </p:stCondLst>
+                      <p:childTnLst>
+                        <p:par>
+                          <p:cTn id="8" fill="hold">
+                            <p:stCondLst>
+                              <p:cond delay="0"/>
+                            </p:stCondLst>
+                            <p:childTnLst>
+                              <p:par>
+                                <p:cTn id="9" presetID="1" presetClass="entr" presetSubtype="0" fill="hold" grpId="0" nodeType="clickEffect">
+                                  <p:stCondLst>
+                                    <p:cond delay="0"/>
+                                  </p:stCondLst>
+                                  <p:childTnLst>
+                                    <p:set>
+                                      <p:cBhvr>
+                                        <p:cTn id="10" dur="1" fill="hold">
+                                          <p:stCondLst>
+                                            <p:cond delay="0"/>
+                                          </p:stCondLst>
+                                        </p:cTn>
+                                        <p:tgtEl>
+                                          <p:spTgt spid="6">
+                                            <p:txEl>
+                                              <p:pRg st="1" end="1"/>
+                                            </p:txEl>
+                                          </p:spTgt>
+                                        </p:tgtEl>
+                                        <p:attrNameLst>
+                                          <p:attrName>style.visibility</p:attrName>
+                                        </p:attrNameLst>
+                                      </p:cBhvr>
+                                      <p:to>
+                                        <p:strVal val="visible"/>
+                                      </p:to>
+                                    </p:set>
+                                  </p:childTnLst>
+                                </p:cTn>
+                              </p:par>
+                            </p:childTnLst>
+                          </p:cTn>
+                        </p:par>
+                      </p:childTnLst>
+                    </p:cTn>
+                  </p:par>
+                  <p:par>
+                    <p:cTn id="11" fill="hold">
+                      <p:stCondLst>
+                        <p:cond delay="indefinite"/>
+                      </p:stCondLst>
+                      <p:childTnLst>
+                        <p:par>
+                          <p:cTn id="12" fill="hold">
+                            <p:stCondLst>
+                              <p:cond delay="0"/>
+                            </p:stCondLst>
+                            <p:childTnLst>
+                              <p:par>
+                                <p:cTn id="13" presetID="1" presetClass="entr" presetSubtype="0" fill="hold" nodeType="clickEffect">
+                                  <p:stCondLst>
+                                    <p:cond delay="0"/>
+                                  </p:stCondLst>
+                                  <p:childTnLst>
+                                    <p:set>
+                                      <p:cBhvr>
+                                        <p:cTn id="14" dur="1" fill="hold">
+                                          <p:stCondLst>
+                                            <p:cond delay="0"/>
+                                          </p:stCondLst>
+                                        </p:cTn>
+                                        <p:tgtEl>
+                                          <p:spTgt spid="5"/>
+                                        </p:tgtEl>
+                                        <p:attrNameLst>
+                                          <p:attrName>style.visibility</p:attrName>
+                                        </p:attrNameLst>
+                                      </p:cBhvr>
+                                      <p:to>
+                                        <p:strVal val="visible"/>
+                                      </p:to>
+                                    </p:set>
+                                  </p:childTnLst>
+                                </p:cTn>
+                              </p:par>
+                            </p:childTnLst>
+                          </p:cTn>
+                        </p:par>
+                      </p:childTnLst>
+                    </p:cTn>
+                  </p:par>
+                </p:childTnLst>
+              </p:cTn>
+              <p:prevCondLst>
+                <p:cond evt="onPrev" delay="0">
+                  <p:tgtEl>
+                    <p:sldTgt/>
+                  </p:tgtEl>
+                </p:cond>
+              </p:prevCondLst>
+              <p:nextCondLst>
+                <p:cond evt="onNext" delay="0">
+                  <p:tgtEl>
+                    <p:sldTgt/>
+                  </p:tgtEl>
+                </p:cond>
+              </p:nextCondLst>
+            </p:seq>
+          </p:childTnLst>
+        </p:cTn>
+      </p:par>
+    </p:tnLst>
+    <p:bldLst>
+      <p:bldP spid="6" grpId="0" build="p"/>
+    </p:bldLst>
+  </p:timing>
 </p:sld>
 </file>
 
@@ -3523,4 +7821,299 @@
     </a:ext>
   </a:extLst>
 </a:theme>
+</file>
+
+<file path=ppt/theme/theme2.xml><?xml version="1.0" encoding="utf-8"?>
+<a:theme xmlns:a="http://schemas.openxmlformats.org/drawingml/2006/main" name="Office Theme">
+  <a:themeElements>
+    <a:clrScheme name="Office">
+      <a:dk1>
+        <a:sysClr val="windowText" lastClr="000000"/>
+      </a:dk1>
+      <a:lt1>
+        <a:sysClr val="window" lastClr="FFFFFF"/>
+      </a:lt1>
+      <a:dk2>
+        <a:srgbClr val="44546A"/>
+      </a:dk2>
+      <a:lt2>
+        <a:srgbClr val="E7E6E6"/>
+      </a:lt2>
+      <a:accent1>
+        <a:srgbClr val="5B9BD5"/>
+      </a:accent1>
+      <a:accent2>
+        <a:srgbClr val="ED7D31"/>
+      </a:accent2>
+      <a:accent3>
+        <a:srgbClr val="A5A5A5"/>
+      </a:accent3>
+      <a:accent4>
+        <a:srgbClr val="FFC000"/>
+      </a:accent4>
+      <a:accent5>
+        <a:srgbClr val="4472C4"/>
+      </a:accent5>
+      <a:accent6>
+        <a:srgbClr val="70AD47"/>
+      </a:accent6>
+      <a:hlink>
+        <a:srgbClr val="0563C1"/>
+      </a:hlink>
+      <a:folHlink>
+        <a:srgbClr val="954F72"/>
+      </a:folHlink>
+    </a:clrScheme>
+    <a:fontScheme name="Office">
+      <a:majorFont>
+        <a:latin typeface="Calibri Light" panose="020F0302020204030204"/>
+        <a:ea typeface=""/>
+        <a:cs typeface=""/>
+        <a:font script="Jpan" typeface="游ゴシック Light"/>
+        <a:font script="Hang" typeface="맑은 고딕"/>
+        <a:font script="Hans" typeface="等线 Light"/>
+        <a:font script="Hant" typeface="新細明體"/>
+        <a:font script="Arab" typeface="Times New Roman"/>
+        <a:font script="Hebr" typeface="Times New Roman"/>
+        <a:font script="Thai" typeface="Angsana New"/>
+        <a:font script="Ethi" typeface="Nyala"/>
+        <a:font script="Beng" typeface="Vrinda"/>
+        <a:font script="Gujr" typeface="Shruti"/>
+        <a:font script="Khmr" typeface="MoolBoran"/>
+        <a:font script="Knda" typeface="Tunga"/>
+        <a:font script="Guru" typeface="Raavi"/>
+        <a:font script="Cans" typeface="Euphemia"/>
+        <a:font script="Cher" typeface="Plantagenet Cherokee"/>
+        <a:font script="Yiii" typeface="Microsoft Yi Baiti"/>
+        <a:font script="Tibt" typeface="Microsoft Himalaya"/>
+        <a:font script="Thaa" typeface="MV Boli"/>
+        <a:font script="Deva" typeface="Mangal"/>
+        <a:font script="Telu" typeface="Gautami"/>
+        <a:font script="Taml" typeface="Latha"/>
+        <a:font script="Syrc" typeface="Estrangelo Edessa"/>
+        <a:font script="Orya" typeface="Kalinga"/>
+        <a:font script="Mlym" typeface="Kartika"/>
+        <a:font script="Laoo" typeface="DokChampa"/>
+        <a:font script="Sinh" typeface="Iskoola Pota"/>
+        <a:font script="Mong" typeface="Mongolian Baiti"/>
+        <a:font script="Viet" typeface="Times New Roman"/>
+        <a:font script="Uigh" typeface="Microsoft Uighur"/>
+        <a:font script="Geor" typeface="Sylfaen"/>
+        <a:font script="Armn" typeface="Arial"/>
+        <a:font script="Bugi" typeface="Leelawadee UI"/>
+        <a:font script="Bopo" typeface="Microsoft JhengHei"/>
+        <a:font script="Java" typeface="Javanese Text"/>
+        <a:font script="Lisu" typeface="Segoe UI"/>
+        <a:font script="Mymr" typeface="Myanmar Text"/>
+        <a:font script="Nkoo" typeface="Ebrima"/>
+        <a:font script="Olck" typeface="Nirmala UI"/>
+        <a:font script="Osma" typeface="Ebrima"/>
+        <a:font script="Phag" typeface="Phagspa"/>
+        <a:font script="Syrn" typeface="Estrangelo Edessa"/>
+        <a:font script="Syrj" typeface="Estrangelo Edessa"/>
+        <a:font script="Syre" typeface="Estrangelo Edessa"/>
+        <a:font script="Sora" typeface="Nirmala UI"/>
+        <a:font script="Tale" typeface="Microsoft Tai Le"/>
+        <a:font script="Talu" typeface="Microsoft New Tai Lue"/>
+        <a:font script="Tfng" typeface="Ebrima"/>
+      </a:majorFont>
+      <a:minorFont>
+        <a:latin typeface="Calibri" panose="020F0502020204030204"/>
+        <a:ea typeface=""/>
+        <a:cs typeface=""/>
+        <a:font script="Jpan" typeface="游ゴシック"/>
+        <a:font script="Hang" typeface="맑은 고딕"/>
+        <a:font script="Hans" typeface="等线"/>
+        <a:font script="Hant" typeface="新細明體"/>
+        <a:font script="Arab" typeface="Arial"/>
+        <a:font script="Hebr" typeface="Arial"/>
+        <a:font script="Thai" typeface="Cordia New"/>
+        <a:font script="Ethi" typeface="Nyala"/>
+        <a:font script="Beng" typeface="Vrinda"/>
+        <a:font script="Gujr" typeface="Shruti"/>
+        <a:font script="Khmr" typeface="DaunPenh"/>
+        <a:font script="Knda" typeface="Tunga"/>
+        <a:font script="Guru" typeface="Raavi"/>
+        <a:font script="Cans" typeface="Euphemia"/>
+        <a:font script="Cher" typeface="Plantagenet Cherokee"/>
+        <a:font script="Yiii" typeface="Microsoft Yi Baiti"/>
+        <a:font script="Tibt" typeface="Microsoft Himalaya"/>
+        <a:font script="Thaa" typeface="MV Boli"/>
+        <a:font script="Deva" typeface="Mangal"/>
+        <a:font script="Telu" typeface="Gautami"/>
+        <a:font script="Taml" typeface="Latha"/>
+        <a:font script="Syrc" typeface="Estrangelo Edessa"/>
+        <a:font script="Orya" typeface="Kalinga"/>
+        <a:font script="Mlym" typeface="Kartika"/>
+        <a:font script="Laoo" typeface="DokChampa"/>
+        <a:font script="Sinh" typeface="Iskoola Pota"/>
+        <a:font script="Mong" typeface="Mongolian Baiti"/>
+        <a:font script="Viet" typeface="Arial"/>
+        <a:font script="Uigh" typeface="Microsoft Uighur"/>
+        <a:font script="Geor" typeface="Sylfaen"/>
+        <a:font script="Armn" typeface="Arial"/>
+        <a:font script="Bugi" typeface="Leelawadee UI"/>
+        <a:font script="Bopo" typeface="Microsoft JhengHei"/>
+        <a:font script="Java" typeface="Javanese Text"/>
+        <a:font script="Lisu" typeface="Segoe UI"/>
+        <a:font script="Mymr" typeface="Myanmar Text"/>
+        <a:font script="Nkoo" typeface="Ebrima"/>
+        <a:font script="Olck" typeface="Nirmala UI"/>
+        <a:font script="Osma" typeface="Ebrima"/>
+        <a:font script="Phag" typeface="Phagspa"/>
+        <a:font script="Syrn" typeface="Estrangelo Edessa"/>
+        <a:font script="Syrj" typeface="Estrangelo Edessa"/>
+        <a:font script="Syre" typeface="Estrangelo Edessa"/>
+        <a:font script="Sora" typeface="Nirmala UI"/>
+        <a:font script="Tale" typeface="Microsoft Tai Le"/>
+        <a:font script="Talu" typeface="Microsoft New Tai Lue"/>
+        <a:font script="Tfng" typeface="Ebrima"/>
+      </a:minorFont>
+    </a:fontScheme>
+    <a:fmtScheme name="Office">
+      <a:fillStyleLst>
+        <a:solidFill>
+          <a:schemeClr val="phClr"/>
+        </a:solidFill>
+        <a:gradFill rotWithShape="1">
+          <a:gsLst>
+            <a:gs pos="0">
+              <a:schemeClr val="phClr">
+                <a:lumMod val="110000"/>
+                <a:satMod val="105000"/>
+                <a:tint val="67000"/>
+              </a:schemeClr>
+            </a:gs>
+            <a:gs pos="50000">
+              <a:schemeClr val="phClr">
+                <a:lumMod val="105000"/>
+                <a:satMod val="103000"/>
+                <a:tint val="73000"/>
+              </a:schemeClr>
+            </a:gs>
+            <a:gs pos="100000">
+              <a:schemeClr val="phClr">
+                <a:lumMod val="105000"/>
+                <a:satMod val="109000"/>
+                <a:tint val="81000"/>
+              </a:schemeClr>
+            </a:gs>
+          </a:gsLst>
+          <a:lin ang="5400000" scaled="0"/>
+        </a:gradFill>
+        <a:gradFill rotWithShape="1">
+          <a:gsLst>
+            <a:gs pos="0">
+              <a:schemeClr val="phClr">
+                <a:satMod val="103000"/>
+                <a:lumMod val="102000"/>
+                <a:tint val="94000"/>
+              </a:schemeClr>
+            </a:gs>
+            <a:gs pos="50000">
+              <a:schemeClr val="phClr">
+                <a:satMod val="110000"/>
+                <a:lumMod val="100000"/>
+                <a:shade val="100000"/>
+              </a:schemeClr>
+            </a:gs>
+            <a:gs pos="100000">
+              <a:schemeClr val="phClr">
+                <a:lumMod val="99000"/>
+                <a:satMod val="120000"/>
+                <a:shade val="78000"/>
+              </a:schemeClr>
+            </a:gs>
+          </a:gsLst>
+          <a:lin ang="5400000" scaled="0"/>
+        </a:gradFill>
+      </a:fillStyleLst>
+      <a:lnStyleLst>
+        <a:ln w="6350" cap="flat" cmpd="sng" algn="ctr">
+          <a:solidFill>
+            <a:schemeClr val="phClr"/>
+          </a:solidFill>
+          <a:prstDash val="solid"/>
+          <a:miter lim="800000"/>
+        </a:ln>
+        <a:ln w="12700" cap="flat" cmpd="sng" algn="ctr">
+          <a:solidFill>
+            <a:schemeClr val="phClr"/>
+          </a:solidFill>
+          <a:prstDash val="solid"/>
+          <a:miter lim="800000"/>
+        </a:ln>
+        <a:ln w="19050" cap="flat" cmpd="sng" algn="ctr">
+          <a:solidFill>
+            <a:schemeClr val="phClr"/>
+          </a:solidFill>
+          <a:prstDash val="solid"/>
+          <a:miter lim="800000"/>
+        </a:ln>
+      </a:lnStyleLst>
+      <a:effectStyleLst>
+        <a:effectStyle>
+          <a:effectLst/>
+        </a:effectStyle>
+        <a:effectStyle>
+          <a:effectLst/>
+        </a:effectStyle>
+        <a:effectStyle>
+          <a:effectLst>
+            <a:outerShdw blurRad="57150" dist="19050" dir="5400000" algn="ctr" rotWithShape="0">
+              <a:srgbClr val="000000">
+                <a:alpha val="63000"/>
+              </a:srgbClr>
+            </a:outerShdw>
+          </a:effectLst>
+        </a:effectStyle>
+      </a:effectStyleLst>
+      <a:bgFillStyleLst>
+        <a:solidFill>
+          <a:schemeClr val="phClr"/>
+        </a:solidFill>
+        <a:solidFill>
+          <a:schemeClr val="phClr">
+            <a:tint val="95000"/>
+            <a:satMod val="170000"/>
+          </a:schemeClr>
+        </a:solidFill>
+        <a:gradFill rotWithShape="1">
+          <a:gsLst>
+            <a:gs pos="0">
+              <a:schemeClr val="phClr">
+                <a:tint val="93000"/>
+                <a:satMod val="150000"/>
+                <a:shade val="98000"/>
+                <a:lumMod val="102000"/>
+              </a:schemeClr>
+            </a:gs>
+            <a:gs pos="50000">
+              <a:schemeClr val="phClr">
+                <a:tint val="98000"/>
+                <a:satMod val="130000"/>
+                <a:shade val="90000"/>
+                <a:lumMod val="103000"/>
+              </a:schemeClr>
+            </a:gs>
+            <a:gs pos="100000">
+              <a:schemeClr val="phClr">
+                <a:shade val="63000"/>
+                <a:satMod val="120000"/>
+              </a:schemeClr>
+            </a:gs>
+          </a:gsLst>
+          <a:lin ang="5400000" scaled="0"/>
+        </a:gradFill>
+      </a:bgFillStyleLst>
+    </a:fmtScheme>
+  </a:themeElements>
+  <a:objectDefaults/>
+  <a:extraClrSchemeLst/>
+  <a:extLst>
+    <a:ext uri="{05A4C25C-085E-4340-85A3-A5531E510DB2}">
+      <thm15:themeFamily xmlns:thm15="http://schemas.microsoft.com/office/thememl/2012/main" name="Office Theme" id="{62F939B6-93AF-4DB8-9C6B-D6C7DFDC589F}" vid="{4A3C46E8-61CC-4603-A589-7422A47A8E4A}"/>
+    </a:ext>
+  </a:extLst>
+</a:theme>
 </file>
</xml_diff>